<commit_message>
#8 Add new slides to the presentation
</commit_message>
<xml_diff>
--- a/presentation.pptx
+++ b/presentation.pptx
@@ -5,7 +5,7 @@
     <p:sldMasterId id="2147483756" r:id="rId1"/>
   </p:sldMasterIdLst>
   <p:notesMasterIdLst>
-    <p:notesMasterId r:id="rId16"/>
+    <p:notesMasterId r:id="rId19"/>
   </p:notesMasterIdLst>
   <p:sldIdLst>
     <p:sldId id="256" r:id="rId2"/>
@@ -21,7 +21,10 @@
     <p:sldId id="266" r:id="rId12"/>
     <p:sldId id="267" r:id="rId13"/>
     <p:sldId id="261" r:id="rId14"/>
-    <p:sldId id="259" r:id="rId15"/>
+    <p:sldId id="272" r:id="rId15"/>
+    <p:sldId id="270" r:id="rId16"/>
+    <p:sldId id="271" r:id="rId17"/>
+    <p:sldId id="259" r:id="rId18"/>
   </p:sldIdLst>
   <p:sldSz cx="12192000" cy="6858000"/>
   <p:notesSz cx="6858000" cy="9144000"/>
@@ -210,7 +213,7 @@
           <a:p>
             <a:fld id="{E52D13D9-638E-1942-BF6D-A0101D8AE78E}" type="datetimeFigureOut">
               <a:rPr lang="en-HU" smtClean="0"/>
-              <a:t>2023. 03. 21.</a:t>
+              <a:t>2023. 05. 22.</a:t>
             </a:fld>
             <a:endParaRPr lang="en-HU"/>
           </a:p>
@@ -619,7 +622,7 @@
           <a:noFill/>
           <a:extLst>
             <a:ext uri="{909E8E84-426E-40dd-AFC4-6F175D3DCCD1}">
-              <a14:hiddenFill xmlns:a14="http://schemas.microsoft.com/office/drawing/2010/main" xmlns="">
+              <a14:hiddenFill xmlns="" xmlns:a14="http://schemas.microsoft.com/office/drawing/2010/main">
                 <a:solidFill>
                   <a:srgbClr val="FFFFFF"/>
                 </a:solidFill>
@@ -679,7 +682,7 @@
             </a:ln>
             <a:extLst>
               <a:ext uri="{91240B29-F687-4f45-9708-019B960494DF}">
-                <a14:hiddenLine xmlns:a14="http://schemas.microsoft.com/office/drawing/2010/main" xmlns="" w="9525">
+                <a14:hiddenLine xmlns="" xmlns:a14="http://schemas.microsoft.com/office/drawing/2010/main" w="9525">
                   <a:solidFill>
                     <a:srgbClr val="000000"/>
                   </a:solidFill>
@@ -769,7 +772,7 @@
             </a:ln>
             <a:extLst>
               <a:ext uri="{91240B29-F687-4f45-9708-019B960494DF}">
-                <a14:hiddenLine xmlns:a14="http://schemas.microsoft.com/office/drawing/2010/main" xmlns="" w="9525">
+                <a14:hiddenLine xmlns="" xmlns:a14="http://schemas.microsoft.com/office/drawing/2010/main" w="9525">
                   <a:solidFill>
                     <a:srgbClr val="000000"/>
                   </a:solidFill>
@@ -859,7 +862,7 @@
             </a:ln>
             <a:extLst>
               <a:ext uri="{91240B29-F687-4f45-9708-019B960494DF}">
-                <a14:hiddenLine xmlns:a14="http://schemas.microsoft.com/office/drawing/2010/main" xmlns="" w="9525">
+                <a14:hiddenLine xmlns="" xmlns:a14="http://schemas.microsoft.com/office/drawing/2010/main" w="9525">
                   <a:solidFill>
                     <a:srgbClr val="000000"/>
                   </a:solidFill>
@@ -893,7 +896,7 @@
             </a:ln>
             <a:extLst>
               <a:ext uri="{91240B29-F687-4f45-9708-019B960494DF}">
-                <a14:hiddenLine xmlns:a14="http://schemas.microsoft.com/office/drawing/2010/main" xmlns="" w="9525">
+                <a14:hiddenLine xmlns="" xmlns:a14="http://schemas.microsoft.com/office/drawing/2010/main" w="9525">
                   <a:solidFill>
                     <a:srgbClr val="000000"/>
                   </a:solidFill>
@@ -983,7 +986,7 @@
             </a:ln>
             <a:extLst>
               <a:ext uri="{91240B29-F687-4f45-9708-019B960494DF}">
-                <a14:hiddenLine xmlns:a14="http://schemas.microsoft.com/office/drawing/2010/main" xmlns="" w="9525">
+                <a14:hiddenLine xmlns="" xmlns:a14="http://schemas.microsoft.com/office/drawing/2010/main" w="9525">
                   <a:solidFill>
                     <a:srgbClr val="000000"/>
                   </a:solidFill>
@@ -1045,7 +1048,7 @@
             </a:ln>
             <a:extLst>
               <a:ext uri="{91240B29-F687-4f45-9708-019B960494DF}">
-                <a14:hiddenLine xmlns:a14="http://schemas.microsoft.com/office/drawing/2010/main" xmlns="" w="9525">
+                <a14:hiddenLine xmlns="" xmlns:a14="http://schemas.microsoft.com/office/drawing/2010/main" w="9525">
                   <a:solidFill>
                     <a:srgbClr val="000000"/>
                   </a:solidFill>
@@ -1107,7 +1110,7 @@
             </a:ln>
             <a:extLst>
               <a:ext uri="{91240B29-F687-4f45-9708-019B960494DF}">
-                <a14:hiddenLine xmlns:a14="http://schemas.microsoft.com/office/drawing/2010/main" xmlns="" w="9525">
+                <a14:hiddenLine xmlns="" xmlns:a14="http://schemas.microsoft.com/office/drawing/2010/main" w="9525">
                   <a:solidFill>
                     <a:srgbClr val="000000"/>
                   </a:solidFill>
@@ -1197,7 +1200,7 @@
             </a:ln>
             <a:extLst>
               <a:ext uri="{91240B29-F687-4f45-9708-019B960494DF}">
-                <a14:hiddenLine xmlns:a14="http://schemas.microsoft.com/office/drawing/2010/main" xmlns="" w="9525">
+                <a14:hiddenLine xmlns="" xmlns:a14="http://schemas.microsoft.com/office/drawing/2010/main" w="9525">
                   <a:solidFill>
                     <a:srgbClr val="000000"/>
                   </a:solidFill>
@@ -1259,7 +1262,7 @@
             </a:ln>
             <a:extLst>
               <a:ext uri="{91240B29-F687-4f45-9708-019B960494DF}">
-                <a14:hiddenLine xmlns:a14="http://schemas.microsoft.com/office/drawing/2010/main" xmlns="" w="9525">
+                <a14:hiddenLine xmlns="" xmlns:a14="http://schemas.microsoft.com/office/drawing/2010/main" w="9525">
                   <a:solidFill>
                     <a:srgbClr val="000000"/>
                   </a:solidFill>
@@ -1321,7 +1324,7 @@
             </a:ln>
             <a:extLst>
               <a:ext uri="{91240B29-F687-4f45-9708-019B960494DF}">
-                <a14:hiddenLine xmlns:a14="http://schemas.microsoft.com/office/drawing/2010/main" xmlns="" w="9525">
+                <a14:hiddenLine xmlns="" xmlns:a14="http://schemas.microsoft.com/office/drawing/2010/main" w="9525">
                   <a:solidFill>
                     <a:srgbClr val="000000"/>
                   </a:solidFill>
@@ -1411,7 +1414,7 @@
             </a:ln>
             <a:extLst>
               <a:ext uri="{91240B29-F687-4f45-9708-019B960494DF}">
-                <a14:hiddenLine xmlns:a14="http://schemas.microsoft.com/office/drawing/2010/main" xmlns="" w="9525">
+                <a14:hiddenLine xmlns="" xmlns:a14="http://schemas.microsoft.com/office/drawing/2010/main" w="9525">
                   <a:solidFill>
                     <a:srgbClr val="000000"/>
                   </a:solidFill>
@@ -1501,7 +1504,7 @@
             </a:ln>
             <a:extLst>
               <a:ext uri="{91240B29-F687-4f45-9708-019B960494DF}">
-                <a14:hiddenLine xmlns:a14="http://schemas.microsoft.com/office/drawing/2010/main" xmlns="" w="9525">
+                <a14:hiddenLine xmlns="" xmlns:a14="http://schemas.microsoft.com/office/drawing/2010/main" w="9525">
                   <a:solidFill>
                     <a:srgbClr val="000000"/>
                   </a:solidFill>
@@ -1563,7 +1566,7 @@
             </a:ln>
             <a:extLst>
               <a:ext uri="{91240B29-F687-4f45-9708-019B960494DF}">
-                <a14:hiddenLine xmlns:a14="http://schemas.microsoft.com/office/drawing/2010/main" xmlns="" w="9525">
+                <a14:hiddenLine xmlns="" xmlns:a14="http://schemas.microsoft.com/office/drawing/2010/main" w="9525">
                   <a:solidFill>
                     <a:srgbClr val="000000"/>
                   </a:solidFill>
@@ -1673,7 +1676,7 @@
             </a:ln>
             <a:extLst>
               <a:ext uri="{91240B29-F687-4f45-9708-019B960494DF}">
-                <a14:hiddenLine xmlns:a14="http://schemas.microsoft.com/office/drawing/2010/main" xmlns="" w="9525">
+                <a14:hiddenLine xmlns="" xmlns:a14="http://schemas.microsoft.com/office/drawing/2010/main" w="9525">
                   <a:solidFill>
                     <a:srgbClr val="000000"/>
                   </a:solidFill>
@@ -1735,7 +1738,7 @@
             </a:ln>
             <a:extLst>
               <a:ext uri="{91240B29-F687-4f45-9708-019B960494DF}">
-                <a14:hiddenLine xmlns:a14="http://schemas.microsoft.com/office/drawing/2010/main" xmlns="" w="9525">
+                <a14:hiddenLine xmlns="" xmlns:a14="http://schemas.microsoft.com/office/drawing/2010/main" w="9525">
                   <a:solidFill>
                     <a:srgbClr val="000000"/>
                   </a:solidFill>
@@ -1825,7 +1828,7 @@
             </a:ln>
             <a:extLst>
               <a:ext uri="{91240B29-F687-4f45-9708-019B960494DF}">
-                <a14:hiddenLine xmlns:a14="http://schemas.microsoft.com/office/drawing/2010/main" xmlns="" w="9525">
+                <a14:hiddenLine xmlns="" xmlns:a14="http://schemas.microsoft.com/office/drawing/2010/main" w="9525">
                   <a:solidFill>
                     <a:srgbClr val="000000"/>
                   </a:solidFill>
@@ -1915,7 +1918,7 @@
             </a:ln>
             <a:extLst>
               <a:ext uri="{91240B29-F687-4f45-9708-019B960494DF}">
-                <a14:hiddenLine xmlns:a14="http://schemas.microsoft.com/office/drawing/2010/main" xmlns="" w="9525">
+                <a14:hiddenLine xmlns="" xmlns:a14="http://schemas.microsoft.com/office/drawing/2010/main" w="9525">
                   <a:solidFill>
                     <a:srgbClr val="000000"/>
                   </a:solidFill>
@@ -1977,7 +1980,7 @@
             </a:ln>
             <a:extLst>
               <a:ext uri="{91240B29-F687-4f45-9708-019B960494DF}">
-                <a14:hiddenLine xmlns:a14="http://schemas.microsoft.com/office/drawing/2010/main" xmlns="" w="9525">
+                <a14:hiddenLine xmlns="" xmlns:a14="http://schemas.microsoft.com/office/drawing/2010/main" w="9525">
                   <a:solidFill>
                     <a:srgbClr val="000000"/>
                   </a:solidFill>
@@ -2067,7 +2070,7 @@
             </a:ln>
             <a:extLst>
               <a:ext uri="{91240B29-F687-4f45-9708-019B960494DF}">
-                <a14:hiddenLine xmlns:a14="http://schemas.microsoft.com/office/drawing/2010/main" xmlns="" w="9525">
+                <a14:hiddenLine xmlns="" xmlns:a14="http://schemas.microsoft.com/office/drawing/2010/main" w="9525">
                   <a:solidFill>
                     <a:srgbClr val="000000"/>
                   </a:solidFill>
@@ -2157,7 +2160,7 @@
             </a:ln>
             <a:extLst>
               <a:ext uri="{91240B29-F687-4f45-9708-019B960494DF}">
-                <a14:hiddenLine xmlns:a14="http://schemas.microsoft.com/office/drawing/2010/main" xmlns="" w="9525">
+                <a14:hiddenLine xmlns="" xmlns:a14="http://schemas.microsoft.com/office/drawing/2010/main" w="9525">
                   <a:solidFill>
                     <a:srgbClr val="000000"/>
                   </a:solidFill>
@@ -2213,7 +2216,7 @@
             </a:ln>
             <a:extLst>
               <a:ext uri="{91240B29-F687-4f45-9708-019B960494DF}">
-                <a14:hiddenLine xmlns:a14="http://schemas.microsoft.com/office/drawing/2010/main" xmlns="" w="9525">
+                <a14:hiddenLine xmlns="" xmlns:a14="http://schemas.microsoft.com/office/drawing/2010/main" w="9525">
                   <a:solidFill>
                     <a:srgbClr val="000000"/>
                   </a:solidFill>
@@ -2303,7 +2306,7 @@
             </a:ln>
             <a:extLst>
               <a:ext uri="{91240B29-F687-4f45-9708-019B960494DF}">
-                <a14:hiddenLine xmlns:a14="http://schemas.microsoft.com/office/drawing/2010/main" xmlns="" w="9525">
+                <a14:hiddenLine xmlns="" xmlns:a14="http://schemas.microsoft.com/office/drawing/2010/main" w="9525">
                   <a:solidFill>
                     <a:srgbClr val="000000"/>
                   </a:solidFill>
@@ -2359,7 +2362,7 @@
             </a:ln>
             <a:extLst>
               <a:ext uri="{91240B29-F687-4f45-9708-019B960494DF}">
-                <a14:hiddenLine xmlns:a14="http://schemas.microsoft.com/office/drawing/2010/main" xmlns="" w="9525">
+                <a14:hiddenLine xmlns="" xmlns:a14="http://schemas.microsoft.com/office/drawing/2010/main" w="9525">
                   <a:solidFill>
                     <a:srgbClr val="000000"/>
                   </a:solidFill>
@@ -2449,7 +2452,7 @@
             </a:ln>
             <a:extLst>
               <a:ext uri="{91240B29-F687-4f45-9708-019B960494DF}">
-                <a14:hiddenLine xmlns:a14="http://schemas.microsoft.com/office/drawing/2010/main" xmlns="" w="9525">
+                <a14:hiddenLine xmlns="" xmlns:a14="http://schemas.microsoft.com/office/drawing/2010/main" w="9525">
                   <a:solidFill>
                     <a:srgbClr val="000000"/>
                   </a:solidFill>
@@ -2517,7 +2520,7 @@
             </a:ln>
             <a:extLst>
               <a:ext uri="{91240B29-F687-4f45-9708-019B960494DF}">
-                <a14:hiddenLine xmlns:a14="http://schemas.microsoft.com/office/drawing/2010/main" xmlns="" w="9525">
+                <a14:hiddenLine xmlns="" xmlns:a14="http://schemas.microsoft.com/office/drawing/2010/main" w="9525">
                   <a:solidFill>
                     <a:srgbClr val="000000"/>
                   </a:solidFill>
@@ -2607,7 +2610,7 @@
             </a:ln>
             <a:extLst>
               <a:ext uri="{91240B29-F687-4f45-9708-019B960494DF}">
-                <a14:hiddenLine xmlns:a14="http://schemas.microsoft.com/office/drawing/2010/main" xmlns="" w="9525">
+                <a14:hiddenLine xmlns="" xmlns:a14="http://schemas.microsoft.com/office/drawing/2010/main" w="9525">
                   <a:solidFill>
                     <a:srgbClr val="000000"/>
                   </a:solidFill>
@@ -2675,7 +2678,7 @@
             </a:ln>
             <a:extLst>
               <a:ext uri="{91240B29-F687-4f45-9708-019B960494DF}">
-                <a14:hiddenLine xmlns:a14="http://schemas.microsoft.com/office/drawing/2010/main" xmlns="" w="9525">
+                <a14:hiddenLine xmlns="" xmlns:a14="http://schemas.microsoft.com/office/drawing/2010/main" w="9525">
                   <a:solidFill>
                     <a:srgbClr val="000000"/>
                   </a:solidFill>
@@ -2765,7 +2768,7 @@
             </a:ln>
             <a:extLst>
               <a:ext uri="{91240B29-F687-4f45-9708-019B960494DF}">
-                <a14:hiddenLine xmlns:a14="http://schemas.microsoft.com/office/drawing/2010/main" xmlns="" w="9525">
+                <a14:hiddenLine xmlns="" xmlns:a14="http://schemas.microsoft.com/office/drawing/2010/main" w="9525">
                   <a:solidFill>
                     <a:srgbClr val="000000"/>
                   </a:solidFill>
@@ -2799,7 +2802,7 @@
             </a:ln>
             <a:extLst>
               <a:ext uri="{91240B29-F687-4f45-9708-019B960494DF}">
-                <a14:hiddenLine xmlns:a14="http://schemas.microsoft.com/office/drawing/2010/main" xmlns="" w="9525">
+                <a14:hiddenLine xmlns="" xmlns:a14="http://schemas.microsoft.com/office/drawing/2010/main" w="9525">
                   <a:solidFill>
                     <a:srgbClr val="000000"/>
                   </a:solidFill>
@@ -2889,7 +2892,7 @@
             </a:ln>
             <a:extLst>
               <a:ext uri="{91240B29-F687-4f45-9708-019B960494DF}">
-                <a14:hiddenLine xmlns:a14="http://schemas.microsoft.com/office/drawing/2010/main" xmlns="" w="9525">
+                <a14:hiddenLine xmlns="" xmlns:a14="http://schemas.microsoft.com/office/drawing/2010/main" w="9525">
                   <a:solidFill>
                     <a:srgbClr val="000000"/>
                   </a:solidFill>
@@ -2951,7 +2954,7 @@
             </a:ln>
             <a:extLst>
               <a:ext uri="{91240B29-F687-4f45-9708-019B960494DF}">
-                <a14:hiddenLine xmlns:a14="http://schemas.microsoft.com/office/drawing/2010/main" xmlns="" w="9525">
+                <a14:hiddenLine xmlns="" xmlns:a14="http://schemas.microsoft.com/office/drawing/2010/main" w="9525">
                   <a:solidFill>
                     <a:srgbClr val="000000"/>
                   </a:solidFill>
@@ -3013,7 +3016,7 @@
             </a:ln>
             <a:extLst>
               <a:ext uri="{91240B29-F687-4f45-9708-019B960494DF}">
-                <a14:hiddenLine xmlns:a14="http://schemas.microsoft.com/office/drawing/2010/main" xmlns="" w="9525">
+                <a14:hiddenLine xmlns="" xmlns:a14="http://schemas.microsoft.com/office/drawing/2010/main" w="9525">
                   <a:solidFill>
                     <a:srgbClr val="000000"/>
                   </a:solidFill>
@@ -3103,7 +3106,7 @@
             </a:ln>
             <a:extLst>
               <a:ext uri="{91240B29-F687-4f45-9708-019B960494DF}">
-                <a14:hiddenLine xmlns:a14="http://schemas.microsoft.com/office/drawing/2010/main" xmlns="" w="9525">
+                <a14:hiddenLine xmlns="" xmlns:a14="http://schemas.microsoft.com/office/drawing/2010/main" w="9525">
                   <a:solidFill>
                     <a:srgbClr val="000000"/>
                   </a:solidFill>
@@ -3171,7 +3174,7 @@
             </a:ln>
             <a:extLst>
               <a:ext uri="{91240B29-F687-4f45-9708-019B960494DF}">
-                <a14:hiddenLine xmlns:a14="http://schemas.microsoft.com/office/drawing/2010/main" xmlns="" w="9525">
+                <a14:hiddenLine xmlns="" xmlns:a14="http://schemas.microsoft.com/office/drawing/2010/main" w="9525">
                   <a:solidFill>
                     <a:srgbClr val="000000"/>
                   </a:solidFill>
@@ -3233,7 +3236,7 @@
             </a:ln>
             <a:extLst>
               <a:ext uri="{91240B29-F687-4f45-9708-019B960494DF}">
-                <a14:hiddenLine xmlns:a14="http://schemas.microsoft.com/office/drawing/2010/main" xmlns="" w="9525">
+                <a14:hiddenLine xmlns="" xmlns:a14="http://schemas.microsoft.com/office/drawing/2010/main" w="9525">
                   <a:solidFill>
                     <a:srgbClr val="000000"/>
                   </a:solidFill>
@@ -3323,7 +3326,7 @@
             </a:ln>
             <a:extLst>
               <a:ext uri="{91240B29-F687-4f45-9708-019B960494DF}">
-                <a14:hiddenLine xmlns:a14="http://schemas.microsoft.com/office/drawing/2010/main" xmlns="" w="9525">
+                <a14:hiddenLine xmlns="" xmlns:a14="http://schemas.microsoft.com/office/drawing/2010/main" w="9525">
                   <a:solidFill>
                     <a:srgbClr val="000000"/>
                   </a:solidFill>
@@ -3385,7 +3388,7 @@
             </a:ln>
             <a:extLst>
               <a:ext uri="{91240B29-F687-4f45-9708-019B960494DF}">
-                <a14:hiddenLine xmlns:a14="http://schemas.microsoft.com/office/drawing/2010/main" xmlns="" w="9525">
+                <a14:hiddenLine xmlns="" xmlns:a14="http://schemas.microsoft.com/office/drawing/2010/main" w="9525">
                   <a:solidFill>
                     <a:srgbClr val="000000"/>
                   </a:solidFill>
@@ -3475,7 +3478,7 @@
             </a:ln>
             <a:extLst>
               <a:ext uri="{91240B29-F687-4f45-9708-019B960494DF}">
-                <a14:hiddenLine xmlns:a14="http://schemas.microsoft.com/office/drawing/2010/main" xmlns="" w="9525">
+                <a14:hiddenLine xmlns="" xmlns:a14="http://schemas.microsoft.com/office/drawing/2010/main" w="9525">
                   <a:solidFill>
                     <a:srgbClr val="000000"/>
                   </a:solidFill>
@@ -3537,7 +3540,7 @@
             </a:ln>
             <a:extLst>
               <a:ext uri="{91240B29-F687-4f45-9708-019B960494DF}">
-                <a14:hiddenLine xmlns:a14="http://schemas.microsoft.com/office/drawing/2010/main" xmlns="" w="9525">
+                <a14:hiddenLine xmlns="" xmlns:a14="http://schemas.microsoft.com/office/drawing/2010/main" w="9525">
                   <a:solidFill>
                     <a:srgbClr val="000000"/>
                   </a:solidFill>
@@ -3627,7 +3630,7 @@
             </a:ln>
             <a:extLst>
               <a:ext uri="{91240B29-F687-4f45-9708-019B960494DF}">
-                <a14:hiddenLine xmlns:a14="http://schemas.microsoft.com/office/drawing/2010/main" xmlns="" w="9525">
+                <a14:hiddenLine xmlns="" xmlns:a14="http://schemas.microsoft.com/office/drawing/2010/main" w="9525">
                   <a:solidFill>
                     <a:srgbClr val="000000"/>
                   </a:solidFill>
@@ -3661,7 +3664,7 @@
             </a:ln>
             <a:extLst>
               <a:ext uri="{91240B29-F687-4f45-9708-019B960494DF}">
-                <a14:hiddenLine xmlns:a14="http://schemas.microsoft.com/office/drawing/2010/main" xmlns="" w="9525">
+                <a14:hiddenLine xmlns="" xmlns:a14="http://schemas.microsoft.com/office/drawing/2010/main" w="9525">
                   <a:solidFill>
                     <a:srgbClr val="000000"/>
                   </a:solidFill>
@@ -3726,7 +3729,7 @@
             </a:ln>
             <a:extLst>
               <a:ext uri="{91240B29-F687-4f45-9708-019B960494DF}">
-                <a14:hiddenLine xmlns:a14="http://schemas.microsoft.com/office/drawing/2010/main" xmlns="" w="9525">
+                <a14:hiddenLine xmlns="" xmlns:a14="http://schemas.microsoft.com/office/drawing/2010/main" w="9525">
                   <a:solidFill>
                     <a:srgbClr val="000000"/>
                   </a:solidFill>
@@ -3816,7 +3819,7 @@
             </a:ln>
             <a:extLst>
               <a:ext uri="{91240B29-F687-4f45-9708-019B960494DF}">
-                <a14:hiddenLine xmlns:a14="http://schemas.microsoft.com/office/drawing/2010/main" xmlns="" w="9525">
+                <a14:hiddenLine xmlns="" xmlns:a14="http://schemas.microsoft.com/office/drawing/2010/main" w="9525">
                   <a:solidFill>
                     <a:srgbClr val="000000"/>
                   </a:solidFill>
@@ -3878,7 +3881,7 @@
             </a:ln>
             <a:extLst>
               <a:ext uri="{91240B29-F687-4f45-9708-019B960494DF}">
-                <a14:hiddenLine xmlns:a14="http://schemas.microsoft.com/office/drawing/2010/main" xmlns="" w="9525">
+                <a14:hiddenLine xmlns="" xmlns:a14="http://schemas.microsoft.com/office/drawing/2010/main" w="9525">
                   <a:solidFill>
                     <a:srgbClr val="000000"/>
                   </a:solidFill>
@@ -3968,7 +3971,7 @@
             </a:ln>
             <a:extLst>
               <a:ext uri="{91240B29-F687-4f45-9708-019B960494DF}">
-                <a14:hiddenLine xmlns:a14="http://schemas.microsoft.com/office/drawing/2010/main" xmlns="" w="9525">
+                <a14:hiddenLine xmlns="" xmlns:a14="http://schemas.microsoft.com/office/drawing/2010/main" w="9525">
                   <a:solidFill>
                     <a:srgbClr val="000000"/>
                   </a:solidFill>
@@ -4058,7 +4061,7 @@
             </a:ln>
             <a:extLst>
               <a:ext uri="{91240B29-F687-4f45-9708-019B960494DF}">
-                <a14:hiddenLine xmlns:a14="http://schemas.microsoft.com/office/drawing/2010/main" xmlns="" w="9525">
+                <a14:hiddenLine xmlns="" xmlns:a14="http://schemas.microsoft.com/office/drawing/2010/main" w="9525">
                   <a:solidFill>
                     <a:srgbClr val="000000"/>
                   </a:solidFill>
@@ -4123,7 +4126,7 @@
             </a:ln>
             <a:extLst>
               <a:ext uri="{91240B29-F687-4f45-9708-019B960494DF}">
-                <a14:hiddenLine xmlns:a14="http://schemas.microsoft.com/office/drawing/2010/main" xmlns="" w="9525">
+                <a14:hiddenLine xmlns="" xmlns:a14="http://schemas.microsoft.com/office/drawing/2010/main" w="9525">
                   <a:solidFill>
                     <a:srgbClr val="000000"/>
                   </a:solidFill>
@@ -4185,7 +4188,7 @@
             </a:ln>
             <a:extLst>
               <a:ext uri="{91240B29-F687-4f45-9708-019B960494DF}">
-                <a14:hiddenLine xmlns:a14="http://schemas.microsoft.com/office/drawing/2010/main" xmlns="" w="9525">
+                <a14:hiddenLine xmlns="" xmlns:a14="http://schemas.microsoft.com/office/drawing/2010/main" w="9525">
                   <a:solidFill>
                     <a:srgbClr val="000000"/>
                   </a:solidFill>
@@ -4275,7 +4278,7 @@
             </a:ln>
             <a:extLst>
               <a:ext uri="{91240B29-F687-4f45-9708-019B960494DF}">
-                <a14:hiddenLine xmlns:a14="http://schemas.microsoft.com/office/drawing/2010/main" xmlns="" w="9525">
+                <a14:hiddenLine xmlns="" xmlns:a14="http://schemas.microsoft.com/office/drawing/2010/main" w="9525">
                   <a:solidFill>
                     <a:srgbClr val="000000"/>
                   </a:solidFill>
@@ -4365,7 +4368,7 @@
             </a:ln>
             <a:extLst>
               <a:ext uri="{91240B29-F687-4f45-9708-019B960494DF}">
-                <a14:hiddenLine xmlns:a14="http://schemas.microsoft.com/office/drawing/2010/main" xmlns="" w="9525">
+                <a14:hiddenLine xmlns="" xmlns:a14="http://schemas.microsoft.com/office/drawing/2010/main" w="9525">
                   <a:solidFill>
                     <a:srgbClr val="000000"/>
                   </a:solidFill>
@@ -4427,7 +4430,7 @@
             </a:ln>
             <a:extLst>
               <a:ext uri="{91240B29-F687-4f45-9708-019B960494DF}">
-                <a14:hiddenLine xmlns:a14="http://schemas.microsoft.com/office/drawing/2010/main" xmlns="" w="9525">
+                <a14:hiddenLine xmlns="" xmlns:a14="http://schemas.microsoft.com/office/drawing/2010/main" w="9525">
                   <a:solidFill>
                     <a:srgbClr val="000000"/>
                   </a:solidFill>
@@ -4547,7 +4550,7 @@
             </a:ln>
             <a:extLst>
               <a:ext uri="{91240B29-F687-4f45-9708-019B960494DF}">
-                <a14:hiddenLine xmlns:a14="http://schemas.microsoft.com/office/drawing/2010/main" xmlns="" w="9525">
+                <a14:hiddenLine xmlns="" xmlns:a14="http://schemas.microsoft.com/office/drawing/2010/main" w="9525">
                   <a:solidFill>
                     <a:srgbClr val="000000"/>
                   </a:solidFill>
@@ -4615,7 +4618,7 @@
             </a:ln>
             <a:extLst>
               <a:ext uri="{91240B29-F687-4f45-9708-019B960494DF}">
-                <a14:hiddenLine xmlns:a14="http://schemas.microsoft.com/office/drawing/2010/main" xmlns="" w="9525">
+                <a14:hiddenLine xmlns="" xmlns:a14="http://schemas.microsoft.com/office/drawing/2010/main" w="9525">
                   <a:solidFill>
                     <a:srgbClr val="000000"/>
                   </a:solidFill>
@@ -4705,7 +4708,7 @@
             </a:ln>
             <a:extLst>
               <a:ext uri="{91240B29-F687-4f45-9708-019B960494DF}">
-                <a14:hiddenLine xmlns:a14="http://schemas.microsoft.com/office/drawing/2010/main" xmlns="" w="9525">
+                <a14:hiddenLine xmlns="" xmlns:a14="http://schemas.microsoft.com/office/drawing/2010/main" w="9525">
                   <a:solidFill>
                     <a:srgbClr val="000000"/>
                   </a:solidFill>
@@ -4845,7 +4848,7 @@
           <a:p>
             <a:fld id="{3E440231-8DCC-48AA-ABEF-1F8D29FA8B99}" type="datetimeFigureOut">
               <a:rPr lang="hu-HU" smtClean="0"/>
-              <a:t>2023. 03. 21.</a:t>
+              <a:t>2023. 05. 22.</a:t>
             </a:fld>
             <a:endParaRPr lang="hu-HU"/>
           </a:p>
@@ -5112,7 +5115,7 @@
           <a:p>
             <a:fld id="{3E440231-8DCC-48AA-ABEF-1F8D29FA8B99}" type="datetimeFigureOut">
               <a:rPr lang="hu-HU" smtClean="0"/>
-              <a:t>2023. 03. 21.</a:t>
+              <a:t>2023. 05. 22.</a:t>
             </a:fld>
             <a:endParaRPr lang="hu-HU"/>
           </a:p>
@@ -5308,7 +5311,7 @@
           <a:p>
             <a:fld id="{3E440231-8DCC-48AA-ABEF-1F8D29FA8B99}" type="datetimeFigureOut">
               <a:rPr lang="hu-HU" smtClean="0"/>
-              <a:t>2023. 03. 21.</a:t>
+              <a:t>2023. 05. 22.</a:t>
             </a:fld>
             <a:endParaRPr lang="hu-HU"/>
           </a:p>
@@ -5571,7 +5574,7 @@
           <a:p>
             <a:fld id="{3E440231-8DCC-48AA-ABEF-1F8D29FA8B99}" type="datetimeFigureOut">
               <a:rPr lang="hu-HU" smtClean="0"/>
-              <a:t>2023. 03. 21.</a:t>
+              <a:t>2023. 05. 22.</a:t>
             </a:fld>
             <a:endParaRPr lang="hu-HU"/>
           </a:p>
@@ -6005,7 +6008,7 @@
           <a:p>
             <a:fld id="{3E440231-8DCC-48AA-ABEF-1F8D29FA8B99}" type="datetimeFigureOut">
               <a:rPr lang="hu-HU" smtClean="0"/>
-              <a:t>2023. 03. 21.</a:t>
+              <a:t>2023. 05. 22.</a:t>
             </a:fld>
             <a:endParaRPr lang="hu-HU"/>
           </a:p>
@@ -6551,7 +6554,7 @@
           <a:p>
             <a:fld id="{3E440231-8DCC-48AA-ABEF-1F8D29FA8B99}" type="datetimeFigureOut">
               <a:rPr lang="hu-HU" smtClean="0"/>
-              <a:t>2023. 03. 21.</a:t>
+              <a:t>2023. 05. 22.</a:t>
             </a:fld>
             <a:endParaRPr lang="hu-HU"/>
           </a:p>
@@ -7271,7 +7274,7 @@
           <a:p>
             <a:fld id="{3E440231-8DCC-48AA-ABEF-1F8D29FA8B99}" type="datetimeFigureOut">
               <a:rPr lang="hu-HU" smtClean="0"/>
-              <a:t>2023. 03. 21.</a:t>
+              <a:t>2023. 05. 22.</a:t>
             </a:fld>
             <a:endParaRPr lang="hu-HU"/>
           </a:p>
@@ -7441,7 +7444,7 @@
           <a:p>
             <a:fld id="{3E440231-8DCC-48AA-ABEF-1F8D29FA8B99}" type="datetimeFigureOut">
               <a:rPr lang="hu-HU" smtClean="0"/>
-              <a:t>2023. 03. 21.</a:t>
+              <a:t>2023. 05. 22.</a:t>
             </a:fld>
             <a:endParaRPr lang="hu-HU"/>
           </a:p>
@@ -7621,7 +7624,7 @@
           <a:p>
             <a:fld id="{3E440231-8DCC-48AA-ABEF-1F8D29FA8B99}" type="datetimeFigureOut">
               <a:rPr lang="hu-HU" smtClean="0"/>
-              <a:t>2023. 03. 21.</a:t>
+              <a:t>2023. 05. 22.</a:t>
             </a:fld>
             <a:endParaRPr lang="hu-HU"/>
           </a:p>
@@ -7791,7 +7794,7 @@
           <a:p>
             <a:fld id="{3E440231-8DCC-48AA-ABEF-1F8D29FA8B99}" type="datetimeFigureOut">
               <a:rPr lang="hu-HU" smtClean="0"/>
-              <a:t>2023. 03. 21.</a:t>
+              <a:t>2023. 05. 22.</a:t>
             </a:fld>
             <a:endParaRPr lang="hu-HU"/>
           </a:p>
@@ -8041,7 +8044,7 @@
           <a:p>
             <a:fld id="{3E440231-8DCC-48AA-ABEF-1F8D29FA8B99}" type="datetimeFigureOut">
               <a:rPr lang="hu-HU" smtClean="0"/>
-              <a:t>2023. 03. 21.</a:t>
+              <a:t>2023. 05. 22.</a:t>
             </a:fld>
             <a:endParaRPr lang="hu-HU"/>
           </a:p>
@@ -8273,7 +8276,7 @@
           <a:p>
             <a:fld id="{3E440231-8DCC-48AA-ABEF-1F8D29FA8B99}" type="datetimeFigureOut">
               <a:rPr lang="hu-HU" smtClean="0"/>
-              <a:t>2023. 03. 21.</a:t>
+              <a:t>2023. 05. 22.</a:t>
             </a:fld>
             <a:endParaRPr lang="hu-HU"/>
           </a:p>
@@ -8654,7 +8657,7 @@
           <a:p>
             <a:fld id="{3E440231-8DCC-48AA-ABEF-1F8D29FA8B99}" type="datetimeFigureOut">
               <a:rPr lang="hu-HU" smtClean="0"/>
-              <a:t>2023. 03. 21.</a:t>
+              <a:t>2023. 05. 22.</a:t>
             </a:fld>
             <a:endParaRPr lang="hu-HU"/>
           </a:p>
@@ -8772,7 +8775,7 @@
           <a:p>
             <a:fld id="{3E440231-8DCC-48AA-ABEF-1F8D29FA8B99}" type="datetimeFigureOut">
               <a:rPr lang="hu-HU" smtClean="0"/>
-              <a:t>2023. 03. 21.</a:t>
+              <a:t>2023. 05. 22.</a:t>
             </a:fld>
             <a:endParaRPr lang="hu-HU"/>
           </a:p>
@@ -8867,7 +8870,7 @@
           <a:p>
             <a:fld id="{3E440231-8DCC-48AA-ABEF-1F8D29FA8B99}" type="datetimeFigureOut">
               <a:rPr lang="hu-HU" smtClean="0"/>
-              <a:t>2023. 03. 21.</a:t>
+              <a:t>2023. 05. 22.</a:t>
             </a:fld>
             <a:endParaRPr lang="hu-HU"/>
           </a:p>
@@ -9116,7 +9119,7 @@
           <a:p>
             <a:fld id="{3E440231-8DCC-48AA-ABEF-1F8D29FA8B99}" type="datetimeFigureOut">
               <a:rPr lang="hu-HU" smtClean="0"/>
-              <a:t>2023. 03. 21.</a:t>
+              <a:t>2023. 05. 22.</a:t>
             </a:fld>
             <a:endParaRPr lang="hu-HU"/>
           </a:p>
@@ -9396,7 +9399,7 @@
           <a:p>
             <a:fld id="{3E440231-8DCC-48AA-ABEF-1F8D29FA8B99}" type="datetimeFigureOut">
               <a:rPr lang="hu-HU" smtClean="0"/>
-              <a:t>2023. 03. 21.</a:t>
+              <a:t>2023. 05. 22.</a:t>
             </a:fld>
             <a:endParaRPr lang="hu-HU"/>
           </a:p>
@@ -9519,7 +9522,7 @@
           <a:noFill/>
           <a:extLst>
             <a:ext uri="{909E8E84-426E-40dd-AFC4-6F175D3DCCD1}">
-              <a14:hiddenFill xmlns:a14="http://schemas.microsoft.com/office/drawing/2010/main" xmlns="">
+              <a14:hiddenFill xmlns="" xmlns:a14="http://schemas.microsoft.com/office/drawing/2010/main">
                 <a:solidFill>
                   <a:srgbClr val="FFFFFF"/>
                 </a:solidFill>
@@ -9593,7 +9596,7 @@
               </a:ln>
               <a:extLst>
                 <a:ext uri="{91240B29-F687-4f45-9708-019B960494DF}">
-                  <a14:hiddenLine xmlns:a14="http://schemas.microsoft.com/office/drawing/2010/main" xmlns="" w="9525">
+                  <a14:hiddenLine xmlns="" xmlns:a14="http://schemas.microsoft.com/office/drawing/2010/main" w="9525">
                     <a:solidFill>
                       <a:srgbClr val="000000"/>
                     </a:solidFill>
@@ -9683,7 +9686,7 @@
               </a:ln>
               <a:extLst>
                 <a:ext uri="{91240B29-F687-4f45-9708-019B960494DF}">
-                  <a14:hiddenLine xmlns:a14="http://schemas.microsoft.com/office/drawing/2010/main" xmlns="" w="9525">
+                  <a14:hiddenLine xmlns="" xmlns:a14="http://schemas.microsoft.com/office/drawing/2010/main" w="9525">
                     <a:solidFill>
                       <a:srgbClr val="000000"/>
                     </a:solidFill>
@@ -9773,7 +9776,7 @@
               </a:ln>
               <a:extLst>
                 <a:ext uri="{91240B29-F687-4f45-9708-019B960494DF}">
-                  <a14:hiddenLine xmlns:a14="http://schemas.microsoft.com/office/drawing/2010/main" xmlns="" w="9525">
+                  <a14:hiddenLine xmlns="" xmlns:a14="http://schemas.microsoft.com/office/drawing/2010/main" w="9525">
                     <a:solidFill>
                       <a:srgbClr val="000000"/>
                     </a:solidFill>
@@ -9835,7 +9838,7 @@
               </a:ln>
               <a:extLst>
                 <a:ext uri="{91240B29-F687-4f45-9708-019B960494DF}">
-                  <a14:hiddenLine xmlns:a14="http://schemas.microsoft.com/office/drawing/2010/main" xmlns="" w="9525">
+                  <a14:hiddenLine xmlns="" xmlns:a14="http://schemas.microsoft.com/office/drawing/2010/main" w="9525">
                     <a:solidFill>
                       <a:srgbClr val="000000"/>
                     </a:solidFill>
@@ -9925,7 +9928,7 @@
               </a:ln>
               <a:extLst>
                 <a:ext uri="{91240B29-F687-4f45-9708-019B960494DF}">
-                  <a14:hiddenLine xmlns:a14="http://schemas.microsoft.com/office/drawing/2010/main" xmlns="" w="9525">
+                  <a14:hiddenLine xmlns="" xmlns:a14="http://schemas.microsoft.com/office/drawing/2010/main" w="9525">
                     <a:solidFill>
                       <a:srgbClr val="000000"/>
                     </a:solidFill>
@@ -9987,7 +9990,7 @@
               </a:ln>
               <a:extLst>
                 <a:ext uri="{91240B29-F687-4f45-9708-019B960494DF}">
-                  <a14:hiddenLine xmlns:a14="http://schemas.microsoft.com/office/drawing/2010/main" xmlns="" w="9525">
+                  <a14:hiddenLine xmlns="" xmlns:a14="http://schemas.microsoft.com/office/drawing/2010/main" w="9525">
                     <a:solidFill>
                       <a:srgbClr val="000000"/>
                     </a:solidFill>
@@ -10049,7 +10052,7 @@
               </a:ln>
               <a:extLst>
                 <a:ext uri="{91240B29-F687-4f45-9708-019B960494DF}">
-                  <a14:hiddenLine xmlns:a14="http://schemas.microsoft.com/office/drawing/2010/main" xmlns="" w="9525">
+                  <a14:hiddenLine xmlns="" xmlns:a14="http://schemas.microsoft.com/office/drawing/2010/main" w="9525">
                     <a:solidFill>
                       <a:srgbClr val="000000"/>
                     </a:solidFill>
@@ -10139,7 +10142,7 @@
               </a:ln>
               <a:extLst>
                 <a:ext uri="{91240B29-F687-4f45-9708-019B960494DF}">
-                  <a14:hiddenLine xmlns:a14="http://schemas.microsoft.com/office/drawing/2010/main" xmlns="" w="9525">
+                  <a14:hiddenLine xmlns="" xmlns:a14="http://schemas.microsoft.com/office/drawing/2010/main" w="9525">
                     <a:solidFill>
                       <a:srgbClr val="000000"/>
                     </a:solidFill>
@@ -10229,7 +10232,7 @@
               </a:ln>
               <a:extLst>
                 <a:ext uri="{91240B29-F687-4f45-9708-019B960494DF}">
-                  <a14:hiddenLine xmlns:a14="http://schemas.microsoft.com/office/drawing/2010/main" xmlns="" w="9525">
+                  <a14:hiddenLine xmlns="" xmlns:a14="http://schemas.microsoft.com/office/drawing/2010/main" w="9525">
                     <a:solidFill>
                       <a:srgbClr val="000000"/>
                     </a:solidFill>
@@ -10291,7 +10294,7 @@
               </a:ln>
               <a:extLst>
                 <a:ext uri="{91240B29-F687-4f45-9708-019B960494DF}">
-                  <a14:hiddenLine xmlns:a14="http://schemas.microsoft.com/office/drawing/2010/main" xmlns="" w="9525">
+                  <a14:hiddenLine xmlns="" xmlns:a14="http://schemas.microsoft.com/office/drawing/2010/main" w="9525">
                     <a:solidFill>
                       <a:srgbClr val="000000"/>
                     </a:solidFill>
@@ -10401,7 +10404,7 @@
               </a:ln>
               <a:extLst>
                 <a:ext uri="{91240B29-F687-4f45-9708-019B960494DF}">
-                  <a14:hiddenLine xmlns:a14="http://schemas.microsoft.com/office/drawing/2010/main" xmlns="" w="9525">
+                  <a14:hiddenLine xmlns="" xmlns:a14="http://schemas.microsoft.com/office/drawing/2010/main" w="9525">
                     <a:solidFill>
                       <a:srgbClr val="000000"/>
                     </a:solidFill>
@@ -10485,7 +10488,7 @@
               </a:ln>
               <a:extLst>
                 <a:ext uri="{91240B29-F687-4f45-9708-019B960494DF}">
-                  <a14:hiddenLine xmlns:a14="http://schemas.microsoft.com/office/drawing/2010/main" xmlns="" w="9525">
+                  <a14:hiddenLine xmlns="" xmlns:a14="http://schemas.microsoft.com/office/drawing/2010/main" w="9525">
                     <a:solidFill>
                       <a:srgbClr val="000000"/>
                     </a:solidFill>
@@ -10547,7 +10550,7 @@
               </a:ln>
               <a:extLst>
                 <a:ext uri="{91240B29-F687-4f45-9708-019B960494DF}">
-                  <a14:hiddenLine xmlns:a14="http://schemas.microsoft.com/office/drawing/2010/main" xmlns="" w="9525">
+                  <a14:hiddenLine xmlns="" xmlns:a14="http://schemas.microsoft.com/office/drawing/2010/main" w="9525">
                     <a:solidFill>
                       <a:srgbClr val="000000"/>
                     </a:solidFill>
@@ -10609,7 +10612,7 @@
               </a:ln>
               <a:extLst>
                 <a:ext uri="{91240B29-F687-4f45-9708-019B960494DF}">
-                  <a14:hiddenLine xmlns:a14="http://schemas.microsoft.com/office/drawing/2010/main" xmlns="" w="9525">
+                  <a14:hiddenLine xmlns="" xmlns:a14="http://schemas.microsoft.com/office/drawing/2010/main" w="9525">
                     <a:solidFill>
                       <a:srgbClr val="000000"/>
                     </a:solidFill>
@@ -10699,7 +10702,7 @@
               </a:ln>
               <a:extLst>
                 <a:ext uri="{91240B29-F687-4f45-9708-019B960494DF}">
-                  <a14:hiddenLine xmlns:a14="http://schemas.microsoft.com/office/drawing/2010/main" xmlns="" w="9525">
+                  <a14:hiddenLine xmlns="" xmlns:a14="http://schemas.microsoft.com/office/drawing/2010/main" w="9525">
                     <a:solidFill>
                       <a:srgbClr val="000000"/>
                     </a:solidFill>
@@ -10733,7 +10736,7 @@
               </a:ln>
               <a:extLst>
                 <a:ext uri="{91240B29-F687-4f45-9708-019B960494DF}">
-                  <a14:hiddenLine xmlns:a14="http://schemas.microsoft.com/office/drawing/2010/main" xmlns="" w="9525">
+                  <a14:hiddenLine xmlns="" xmlns:a14="http://schemas.microsoft.com/office/drawing/2010/main" w="9525">
                     <a:solidFill>
                       <a:srgbClr val="000000"/>
                     </a:solidFill>
@@ -10798,7 +10801,7 @@
               </a:ln>
               <a:extLst>
                 <a:ext uri="{91240B29-F687-4f45-9708-019B960494DF}">
-                  <a14:hiddenLine xmlns:a14="http://schemas.microsoft.com/office/drawing/2010/main" xmlns="" w="9525">
+                  <a14:hiddenLine xmlns="" xmlns:a14="http://schemas.microsoft.com/office/drawing/2010/main" w="9525">
                     <a:solidFill>
                       <a:srgbClr val="000000"/>
                     </a:solidFill>
@@ -10888,7 +10891,7 @@
               </a:ln>
               <a:extLst>
                 <a:ext uri="{91240B29-F687-4f45-9708-019B960494DF}">
-                  <a14:hiddenLine xmlns:a14="http://schemas.microsoft.com/office/drawing/2010/main" xmlns="" w="9525">
+                  <a14:hiddenLine xmlns="" xmlns:a14="http://schemas.microsoft.com/office/drawing/2010/main" w="9525">
                     <a:solidFill>
                       <a:srgbClr val="000000"/>
                     </a:solidFill>
@@ -10950,7 +10953,7 @@
               </a:ln>
               <a:extLst>
                 <a:ext uri="{91240B29-F687-4f45-9708-019B960494DF}">
-                  <a14:hiddenLine xmlns:a14="http://schemas.microsoft.com/office/drawing/2010/main" xmlns="" w="9525">
+                  <a14:hiddenLine xmlns="" xmlns:a14="http://schemas.microsoft.com/office/drawing/2010/main" w="9525">
                     <a:solidFill>
                       <a:srgbClr val="000000"/>
                     </a:solidFill>
@@ -11040,7 +11043,7 @@
               </a:ln>
               <a:extLst>
                 <a:ext uri="{91240B29-F687-4f45-9708-019B960494DF}">
-                  <a14:hiddenLine xmlns:a14="http://schemas.microsoft.com/office/drawing/2010/main" xmlns="" w="9525">
+                  <a14:hiddenLine xmlns="" xmlns:a14="http://schemas.microsoft.com/office/drawing/2010/main" w="9525">
                     <a:solidFill>
                       <a:srgbClr val="000000"/>
                     </a:solidFill>
@@ -11105,7 +11108,7 @@
               </a:ln>
               <a:extLst>
                 <a:ext uri="{91240B29-F687-4f45-9708-019B960494DF}">
-                  <a14:hiddenLine xmlns:a14="http://schemas.microsoft.com/office/drawing/2010/main" xmlns="" w="9525">
+                  <a14:hiddenLine xmlns="" xmlns:a14="http://schemas.microsoft.com/office/drawing/2010/main" w="9525">
                     <a:solidFill>
                       <a:srgbClr val="000000"/>
                     </a:solidFill>
@@ -11167,7 +11170,7 @@
               </a:ln>
               <a:extLst>
                 <a:ext uri="{91240B29-F687-4f45-9708-019B960494DF}">
-                  <a14:hiddenLine xmlns:a14="http://schemas.microsoft.com/office/drawing/2010/main" xmlns="" w="9525">
+                  <a14:hiddenLine xmlns="" xmlns:a14="http://schemas.microsoft.com/office/drawing/2010/main" w="9525">
                     <a:solidFill>
                       <a:srgbClr val="000000"/>
                     </a:solidFill>
@@ -11257,7 +11260,7 @@
               </a:ln>
               <a:extLst>
                 <a:ext uri="{91240B29-F687-4f45-9708-019B960494DF}">
-                  <a14:hiddenLine xmlns:a14="http://schemas.microsoft.com/office/drawing/2010/main" xmlns="" w="9525">
+                  <a14:hiddenLine xmlns="" xmlns:a14="http://schemas.microsoft.com/office/drawing/2010/main" w="9525">
                     <a:solidFill>
                       <a:srgbClr val="000000"/>
                     </a:solidFill>
@@ -11347,7 +11350,7 @@
               </a:ln>
               <a:extLst>
                 <a:ext uri="{91240B29-F687-4f45-9708-019B960494DF}">
-                  <a14:hiddenLine xmlns:a14="http://schemas.microsoft.com/office/drawing/2010/main" xmlns="" w="9525">
+                  <a14:hiddenLine xmlns="" xmlns:a14="http://schemas.microsoft.com/office/drawing/2010/main" w="9525">
                     <a:solidFill>
                       <a:srgbClr val="000000"/>
                     </a:solidFill>
@@ -11412,7 +11415,7 @@
               </a:ln>
               <a:extLst>
                 <a:ext uri="{91240B29-F687-4f45-9708-019B960494DF}">
-                  <a14:hiddenLine xmlns:a14="http://schemas.microsoft.com/office/drawing/2010/main" xmlns="" w="9525">
+                  <a14:hiddenLine xmlns="" xmlns:a14="http://schemas.microsoft.com/office/drawing/2010/main" w="9525">
                     <a:solidFill>
                       <a:srgbClr val="000000"/>
                     </a:solidFill>
@@ -11532,7 +11535,7 @@
               </a:ln>
               <a:extLst>
                 <a:ext uri="{91240B29-F687-4f45-9708-019B960494DF}">
-                  <a14:hiddenLine xmlns:a14="http://schemas.microsoft.com/office/drawing/2010/main" xmlns="" w="9525">
+                  <a14:hiddenLine xmlns="" xmlns:a14="http://schemas.microsoft.com/office/drawing/2010/main" w="9525">
                     <a:solidFill>
                       <a:srgbClr val="000000"/>
                     </a:solidFill>
@@ -11630,7 +11633,7 @@
               </a:ln>
               <a:extLst>
                 <a:ext uri="{91240B29-F687-4f45-9708-019B960494DF}">
-                  <a14:hiddenLine xmlns:a14="http://schemas.microsoft.com/office/drawing/2010/main" xmlns="" w="9525">
+                  <a14:hiddenLine xmlns="" xmlns:a14="http://schemas.microsoft.com/office/drawing/2010/main" w="9525">
                     <a:solidFill>
                       <a:srgbClr val="000000"/>
                     </a:solidFill>
@@ -11745,7 +11748,7 @@
               </a:ln>
               <a:extLst>
                 <a:ext uri="{91240B29-F687-4f45-9708-019B960494DF}">
-                  <a14:hiddenLine xmlns:a14="http://schemas.microsoft.com/office/drawing/2010/main" xmlns="" w="9525">
+                  <a14:hiddenLine xmlns="" xmlns:a14="http://schemas.microsoft.com/office/drawing/2010/main" w="9525">
                     <a:solidFill>
                       <a:srgbClr val="000000"/>
                     </a:solidFill>
@@ -11835,7 +11838,7 @@
               </a:ln>
               <a:extLst>
                 <a:ext uri="{91240B29-F687-4f45-9708-019B960494DF}">
-                  <a14:hiddenLine xmlns:a14="http://schemas.microsoft.com/office/drawing/2010/main" xmlns="" w="9525">
+                  <a14:hiddenLine xmlns="" xmlns:a14="http://schemas.microsoft.com/office/drawing/2010/main" w="9525">
                     <a:solidFill>
                       <a:srgbClr val="000000"/>
                     </a:solidFill>
@@ -11900,7 +11903,7 @@
               </a:ln>
               <a:extLst>
                 <a:ext uri="{91240B29-F687-4f45-9708-019B960494DF}">
-                  <a14:hiddenLine xmlns:a14="http://schemas.microsoft.com/office/drawing/2010/main" xmlns="" w="9525">
+                  <a14:hiddenLine xmlns="" xmlns:a14="http://schemas.microsoft.com/office/drawing/2010/main" w="9525">
                     <a:solidFill>
                       <a:srgbClr val="000000"/>
                     </a:solidFill>
@@ -11990,7 +11993,7 @@
               </a:ln>
               <a:extLst>
                 <a:ext uri="{91240B29-F687-4f45-9708-019B960494DF}">
-                  <a14:hiddenLine xmlns:a14="http://schemas.microsoft.com/office/drawing/2010/main" xmlns="" w="9525">
+                  <a14:hiddenLine xmlns="" xmlns:a14="http://schemas.microsoft.com/office/drawing/2010/main" w="9525">
                     <a:solidFill>
                       <a:srgbClr val="000000"/>
                     </a:solidFill>
@@ -12058,7 +12061,7 @@
               </a:ln>
               <a:extLst>
                 <a:ext uri="{91240B29-F687-4f45-9708-019B960494DF}">
-                  <a14:hiddenLine xmlns:a14="http://schemas.microsoft.com/office/drawing/2010/main" xmlns="" w="9525">
+                  <a14:hiddenLine xmlns="" xmlns:a14="http://schemas.microsoft.com/office/drawing/2010/main" w="9525">
                     <a:solidFill>
                       <a:srgbClr val="000000"/>
                     </a:solidFill>
@@ -12148,7 +12151,7 @@
               </a:ln>
               <a:extLst>
                 <a:ext uri="{91240B29-F687-4f45-9708-019B960494DF}">
-                  <a14:hiddenLine xmlns:a14="http://schemas.microsoft.com/office/drawing/2010/main" xmlns="" w="9525">
+                  <a14:hiddenLine xmlns="" xmlns:a14="http://schemas.microsoft.com/office/drawing/2010/main" w="9525">
                     <a:solidFill>
                       <a:srgbClr val="000000"/>
                     </a:solidFill>
@@ -12216,7 +12219,7 @@
               </a:ln>
               <a:extLst>
                 <a:ext uri="{91240B29-F687-4f45-9708-019B960494DF}">
-                  <a14:hiddenLine xmlns:a14="http://schemas.microsoft.com/office/drawing/2010/main" xmlns="" w="9525">
+                  <a14:hiddenLine xmlns="" xmlns:a14="http://schemas.microsoft.com/office/drawing/2010/main" w="9525">
                     <a:solidFill>
                       <a:srgbClr val="000000"/>
                     </a:solidFill>
@@ -12306,7 +12309,7 @@
               </a:ln>
               <a:extLst>
                 <a:ext uri="{91240B29-F687-4f45-9708-019B960494DF}">
-                  <a14:hiddenLine xmlns:a14="http://schemas.microsoft.com/office/drawing/2010/main" xmlns="" w="9525">
+                  <a14:hiddenLine xmlns="" xmlns:a14="http://schemas.microsoft.com/office/drawing/2010/main" w="9525">
                     <a:solidFill>
                       <a:srgbClr val="000000"/>
                     </a:solidFill>
@@ -12340,7 +12343,7 @@
               </a:ln>
               <a:extLst>
                 <a:ext uri="{91240B29-F687-4f45-9708-019B960494DF}">
-                  <a14:hiddenLine xmlns:a14="http://schemas.microsoft.com/office/drawing/2010/main" xmlns="" w="9525">
+                  <a14:hiddenLine xmlns="" xmlns:a14="http://schemas.microsoft.com/office/drawing/2010/main" w="9525">
                     <a:solidFill>
                       <a:srgbClr val="000000"/>
                     </a:solidFill>
@@ -12480,7 +12483,7 @@
           <a:p>
             <a:fld id="{3E440231-8DCC-48AA-ABEF-1F8D29FA8B99}" type="datetimeFigureOut">
               <a:rPr lang="hu-HU" smtClean="0"/>
-              <a:t>2023. 03. 21.</a:t>
+              <a:t>2023. 05. 22.</a:t>
             </a:fld>
             <a:endParaRPr lang="hu-HU"/>
           </a:p>
@@ -13393,6 +13396,7 @@
           <a:bodyPr/>
           <a:lstStyle/>
           <a:p>
+            <a:pPr algn="ctr"/>
             <a:r>
               <a:rPr lang="en-HU" dirty="0"/>
               <a:t>További tanulmányok</a:t>
@@ -13544,7 +13548,7 @@
             <a:pPr algn="ctr"/>
             <a:r>
               <a:rPr lang="hu-HU" dirty="0"/>
-              <a:t>Megvalósítás</a:t>
+              <a:t>Megvalósítási tervek</a:t>
             </a:r>
           </a:p>
         </p:txBody>
@@ -13740,6 +13744,397 @@
 </file>
 
 <file path=ppt/slides/slide14.xml><?xml version="1.0" encoding="utf-8"?>
+<p:sld xmlns:a="http://schemas.openxmlformats.org/drawingml/2006/main" xmlns:r="http://schemas.openxmlformats.org/officeDocument/2006/relationships" xmlns:p="http://schemas.openxmlformats.org/presentationml/2006/main">
+  <p:cSld>
+    <p:spTree>
+      <p:nvGrpSpPr>
+        <p:cNvPr id="1" name=""/>
+        <p:cNvGrpSpPr/>
+        <p:nvPr/>
+      </p:nvGrpSpPr>
+      <p:grpSpPr>
+        <a:xfrm>
+          <a:off x="0" y="0"/>
+          <a:ext cx="0" cy="0"/>
+          <a:chOff x="0" y="0"/>
+          <a:chExt cx="0" cy="0"/>
+        </a:xfrm>
+      </p:grpSpPr>
+      <p:sp>
+        <p:nvSpPr>
+          <p:cNvPr id="2" name="Title 1">
+            <a:extLst>
+              <a:ext uri="{FF2B5EF4-FFF2-40B4-BE49-F238E27FC236}">
+                <a16:creationId xmlns:a16="http://schemas.microsoft.com/office/drawing/2014/main" id="{7D8D614D-7693-1B7E-F134-810E54902D1A}"/>
+              </a:ext>
+            </a:extLst>
+          </p:cNvPr>
+          <p:cNvSpPr>
+            <a:spLocks noGrp="1"/>
+          </p:cNvSpPr>
+          <p:nvPr>
+            <p:ph type="title"/>
+          </p:nvPr>
+        </p:nvSpPr>
+        <p:spPr/>
+        <p:txBody>
+          <a:bodyPr/>
+          <a:lstStyle/>
+          <a:p>
+            <a:pPr algn="ctr"/>
+            <a:r>
+              <a:rPr lang="en-HU" dirty="0"/>
+              <a:t>Adathalmaz</a:t>
+            </a:r>
+          </a:p>
+        </p:txBody>
+      </p:sp>
+      <p:sp>
+        <p:nvSpPr>
+          <p:cNvPr id="3" name="Content Placeholder 2">
+            <a:extLst>
+              <a:ext uri="{FF2B5EF4-FFF2-40B4-BE49-F238E27FC236}">
+                <a16:creationId xmlns:a16="http://schemas.microsoft.com/office/drawing/2014/main" id="{1CF56CAA-EF91-1394-152C-67749508CB42}"/>
+              </a:ext>
+            </a:extLst>
+          </p:cNvPr>
+          <p:cNvSpPr>
+            <a:spLocks noGrp="1"/>
+          </p:cNvSpPr>
+          <p:nvPr>
+            <p:ph idx="1"/>
+          </p:nvPr>
+        </p:nvSpPr>
+        <p:spPr/>
+        <p:txBody>
+          <a:bodyPr/>
+          <a:lstStyle/>
+          <a:p>
+            <a:r>
+              <a:rPr lang="en-HU" dirty="0">
+                <a:solidFill>
+                  <a:schemeClr val="bg1"/>
+                </a:solidFill>
+              </a:rPr>
+              <a:t>2001 HCFCD Lidar: Harris County Point Cloud (</a:t>
+            </a:r>
+            <a:r>
+              <a:rPr lang="en-GB" b="0" i="0" u="none" strike="noStrike" dirty="0">
+                <a:solidFill>
+                  <a:schemeClr val="bg1"/>
+                </a:solidFill>
+                <a:effectLst/>
+                <a:latin typeface="-apple-system"/>
+                <a:hlinkClick r:id="rId2">
+                  <a:extLst>
+                    <a:ext uri="{A12FA001-AC4F-418D-AE19-62706E023703}">
+                      <ahyp:hlinkClr xmlns:ahyp="http://schemas.microsoft.com/office/drawing/2018/hyperlinkcolor" val="tx"/>
+                    </a:ext>
+                  </a:extLst>
+                </a:hlinkClick>
+              </a:rPr>
+              <a:t>https://noaa-nos-coastal-lidar-pds.s3.amazonaws.com/laz/geoid18/102/index.html</a:t>
+            </a:r>
+            <a:r>
+              <a:rPr lang="en-HU" dirty="0">
+                <a:solidFill>
+                  <a:schemeClr val="bg1"/>
+                </a:solidFill>
+              </a:rPr>
+              <a:t>)</a:t>
+            </a:r>
+          </a:p>
+          <a:p>
+            <a:r>
+              <a:rPr lang="hu-HU" dirty="0">
+                <a:solidFill>
+                  <a:schemeClr val="bg1"/>
+                </a:solidFill>
+              </a:rPr>
+              <a:t>1. adathalmaz: 20011104_950.laz</a:t>
+            </a:r>
+          </a:p>
+          <a:p>
+            <a:r>
+              <a:rPr lang="hu-HU" dirty="0">
+                <a:solidFill>
+                  <a:schemeClr val="bg1"/>
+                </a:solidFill>
+              </a:rPr>
+              <a:t>2. adathalmaz: 20011104_959.laz</a:t>
+            </a:r>
+          </a:p>
+        </p:txBody>
+      </p:sp>
+    </p:spTree>
+    <p:extLst>
+      <p:ext uri="{BB962C8B-B14F-4D97-AF65-F5344CB8AC3E}">
+        <p14:creationId xmlns:p14="http://schemas.microsoft.com/office/powerpoint/2010/main" val="645243558"/>
+      </p:ext>
+    </p:extLst>
+  </p:cSld>
+  <p:clrMapOvr>
+    <a:masterClrMapping/>
+  </p:clrMapOvr>
+</p:sld>
+</file>
+
+<file path=ppt/slides/slide15.xml><?xml version="1.0" encoding="utf-8"?>
+<p:sld xmlns:a="http://schemas.openxmlformats.org/drawingml/2006/main" xmlns:r="http://schemas.openxmlformats.org/officeDocument/2006/relationships" xmlns:p="http://schemas.openxmlformats.org/presentationml/2006/main">
+  <p:cSld>
+    <p:spTree>
+      <p:nvGrpSpPr>
+        <p:cNvPr id="1" name=""/>
+        <p:cNvGrpSpPr/>
+        <p:nvPr/>
+      </p:nvGrpSpPr>
+      <p:grpSpPr>
+        <a:xfrm>
+          <a:off x="0" y="0"/>
+          <a:ext cx="0" cy="0"/>
+          <a:chOff x="0" y="0"/>
+          <a:chExt cx="0" cy="0"/>
+        </a:xfrm>
+      </p:grpSpPr>
+      <p:sp>
+        <p:nvSpPr>
+          <p:cNvPr id="2" name="Title 1">
+            <a:extLst>
+              <a:ext uri="{FF2B5EF4-FFF2-40B4-BE49-F238E27FC236}">
+                <a16:creationId xmlns:a16="http://schemas.microsoft.com/office/drawing/2014/main" id="{AE5F3FE0-4CCE-CF59-C822-86D0AFDEB5E1}"/>
+              </a:ext>
+            </a:extLst>
+          </p:cNvPr>
+          <p:cNvSpPr>
+            <a:spLocks noGrp="1"/>
+          </p:cNvSpPr>
+          <p:nvPr>
+            <p:ph type="title"/>
+          </p:nvPr>
+        </p:nvSpPr>
+        <p:spPr/>
+        <p:txBody>
+          <a:bodyPr/>
+          <a:lstStyle/>
+          <a:p>
+            <a:pPr algn="ctr"/>
+            <a:r>
+              <a:rPr lang="en-HU" dirty="0"/>
+              <a:t>Felhasznált Technológiák</a:t>
+            </a:r>
+          </a:p>
+        </p:txBody>
+      </p:sp>
+      <p:sp>
+        <p:nvSpPr>
+          <p:cNvPr id="3" name="Content Placeholder 2">
+            <a:extLst>
+              <a:ext uri="{FF2B5EF4-FFF2-40B4-BE49-F238E27FC236}">
+                <a16:creationId xmlns:a16="http://schemas.microsoft.com/office/drawing/2014/main" id="{14EB60E9-50EF-3318-E212-614E42C0E1AD}"/>
+              </a:ext>
+            </a:extLst>
+          </p:cNvPr>
+          <p:cNvSpPr>
+            <a:spLocks noGrp="1"/>
+          </p:cNvSpPr>
+          <p:nvPr>
+            <p:ph idx="1"/>
+          </p:nvPr>
+        </p:nvSpPr>
+        <p:spPr/>
+        <p:txBody>
+          <a:bodyPr/>
+          <a:lstStyle/>
+          <a:p>
+            <a:r>
+              <a:rPr lang="en-HU" dirty="0">
+                <a:solidFill>
+                  <a:schemeClr val="bg1"/>
+                </a:solidFill>
+              </a:rPr>
+              <a:t>Python package-k:</a:t>
+            </a:r>
+          </a:p>
+          <a:p>
+            <a:pPr lvl="1"/>
+            <a:r>
+              <a:rPr lang="en-GB" dirty="0">
+                <a:solidFill>
+                  <a:schemeClr val="bg1"/>
+                </a:solidFill>
+              </a:rPr>
+              <a:t>l</a:t>
+            </a:r>
+            <a:r>
+              <a:rPr lang="en-HU" dirty="0">
+                <a:solidFill>
+                  <a:schemeClr val="bg1"/>
+                </a:solidFill>
+              </a:rPr>
+              <a:t>aspy</a:t>
+            </a:r>
+          </a:p>
+          <a:p>
+            <a:pPr lvl="1"/>
+            <a:r>
+              <a:rPr lang="en-GB" dirty="0">
+                <a:solidFill>
+                  <a:schemeClr val="bg1"/>
+                </a:solidFill>
+              </a:rPr>
+              <a:t>o</a:t>
+            </a:r>
+            <a:r>
+              <a:rPr lang="en-HU" dirty="0">
+                <a:solidFill>
+                  <a:schemeClr val="bg1"/>
+                </a:solidFill>
+              </a:rPr>
+              <a:t>pen3d</a:t>
+            </a:r>
+          </a:p>
+          <a:p>
+            <a:pPr lvl="1"/>
+            <a:r>
+              <a:rPr lang="en-GB" dirty="0">
+                <a:solidFill>
+                  <a:schemeClr val="bg1"/>
+                </a:solidFill>
+              </a:rPr>
+              <a:t>n</a:t>
+            </a:r>
+            <a:r>
+              <a:rPr lang="en-HU" dirty="0">
+                <a:solidFill>
+                  <a:schemeClr val="bg1"/>
+                </a:solidFill>
+              </a:rPr>
+              <a:t>umpy</a:t>
+            </a:r>
+          </a:p>
+          <a:p>
+            <a:pPr lvl="1"/>
+            <a:r>
+              <a:rPr lang="en-GB" dirty="0">
+                <a:solidFill>
+                  <a:schemeClr val="bg1"/>
+                </a:solidFill>
+              </a:rPr>
+              <a:t>g</a:t>
+            </a:r>
+            <a:r>
+              <a:rPr lang="en-HU" dirty="0">
+                <a:solidFill>
+                  <a:schemeClr val="bg1"/>
+                </a:solidFill>
+              </a:rPr>
+              <a:t>dal</a:t>
+            </a:r>
+          </a:p>
+          <a:p>
+            <a:pPr lvl="1"/>
+            <a:endParaRPr lang="en-HU" dirty="0"/>
+          </a:p>
+        </p:txBody>
+      </p:sp>
+    </p:spTree>
+    <p:extLst>
+      <p:ext uri="{BB962C8B-B14F-4D97-AF65-F5344CB8AC3E}">
+        <p14:creationId xmlns:p14="http://schemas.microsoft.com/office/powerpoint/2010/main" val="1994437763"/>
+      </p:ext>
+    </p:extLst>
+  </p:cSld>
+  <p:clrMapOvr>
+    <a:masterClrMapping/>
+  </p:clrMapOvr>
+</p:sld>
+</file>
+
+<file path=ppt/slides/slide16.xml><?xml version="1.0" encoding="utf-8"?>
+<p:sld xmlns:a="http://schemas.openxmlformats.org/drawingml/2006/main" xmlns:r="http://schemas.openxmlformats.org/officeDocument/2006/relationships" xmlns:p="http://schemas.openxmlformats.org/presentationml/2006/main">
+  <p:cSld>
+    <p:spTree>
+      <p:nvGrpSpPr>
+        <p:cNvPr id="1" name=""/>
+        <p:cNvGrpSpPr/>
+        <p:nvPr/>
+      </p:nvGrpSpPr>
+      <p:grpSpPr>
+        <a:xfrm>
+          <a:off x="0" y="0"/>
+          <a:ext cx="0" cy="0"/>
+          <a:chOff x="0" y="0"/>
+          <a:chExt cx="0" cy="0"/>
+        </a:xfrm>
+      </p:grpSpPr>
+      <p:sp>
+        <p:nvSpPr>
+          <p:cNvPr id="2" name="Title 1">
+            <a:extLst>
+              <a:ext uri="{FF2B5EF4-FFF2-40B4-BE49-F238E27FC236}">
+                <a16:creationId xmlns:a16="http://schemas.microsoft.com/office/drawing/2014/main" id="{037F52B9-FC31-980D-E9C8-98F184BEB302}"/>
+              </a:ext>
+            </a:extLst>
+          </p:cNvPr>
+          <p:cNvSpPr>
+            <a:spLocks noGrp="1"/>
+          </p:cNvSpPr>
+          <p:nvPr>
+            <p:ph type="title"/>
+          </p:nvPr>
+        </p:nvSpPr>
+        <p:spPr/>
+        <p:txBody>
+          <a:bodyPr/>
+          <a:lstStyle/>
+          <a:p>
+            <a:pPr algn="ctr"/>
+            <a:r>
+              <a:rPr lang="en-HU" dirty="0"/>
+              <a:t>Eredmények</a:t>
+            </a:r>
+          </a:p>
+        </p:txBody>
+      </p:sp>
+      <p:sp>
+        <p:nvSpPr>
+          <p:cNvPr id="3" name="Content Placeholder 2">
+            <a:extLst>
+              <a:ext uri="{FF2B5EF4-FFF2-40B4-BE49-F238E27FC236}">
+                <a16:creationId xmlns:a16="http://schemas.microsoft.com/office/drawing/2014/main" id="{D63188C1-26CE-DAED-9A1C-6668462D04C9}"/>
+              </a:ext>
+            </a:extLst>
+          </p:cNvPr>
+          <p:cNvSpPr>
+            <a:spLocks noGrp="1"/>
+          </p:cNvSpPr>
+          <p:nvPr>
+            <p:ph idx="1"/>
+          </p:nvPr>
+        </p:nvSpPr>
+        <p:spPr/>
+        <p:txBody>
+          <a:bodyPr/>
+          <a:lstStyle/>
+          <a:p>
+            <a:endParaRPr lang="en-HU"/>
+          </a:p>
+        </p:txBody>
+      </p:sp>
+    </p:spTree>
+    <p:extLst>
+      <p:ext uri="{BB962C8B-B14F-4D97-AF65-F5344CB8AC3E}">
+        <p14:creationId xmlns:p14="http://schemas.microsoft.com/office/powerpoint/2010/main" val="2719818494"/>
+      </p:ext>
+    </p:extLst>
+  </p:cSld>
+  <p:clrMapOvr>
+    <a:masterClrMapping/>
+  </p:clrMapOvr>
+</p:sld>
+</file>
+
+<file path=ppt/slides/slide17.xml><?xml version="1.0" encoding="utf-8"?>
 <p:sld xmlns:a="http://schemas.openxmlformats.org/drawingml/2006/main" xmlns:r="http://schemas.openxmlformats.org/officeDocument/2006/relationships" xmlns:p="http://schemas.openxmlformats.org/presentationml/2006/main">
   <p:cSld>
     <p:bg>
@@ -15322,7 +15717,7 @@
             <a:noFill/>
             <a:extLst>
               <a:ext uri="{909E8E84-426E-40dd-AFC4-6F175D3DCCD1}">
-                <a14:hiddenFill xmlns:p14="http://schemas.microsoft.com/office/powerpoint/2010/main" xmlns:a14="http://schemas.microsoft.com/office/drawing/2010/main" xmlns:a16="http://schemas.microsoft.com/office/drawing/2014/main" xmlns="">
+                <a14:hiddenFill xmlns="" xmlns:a16="http://schemas.microsoft.com/office/drawing/2014/main" xmlns:a14="http://schemas.microsoft.com/office/drawing/2010/main" xmlns:p14="http://schemas.microsoft.com/office/powerpoint/2010/main">
                   <a:solidFill>
                     <a:srgbClr val="FFFFFF"/>
                   </a:solidFill>
@@ -15477,7 +15872,7 @@
             </a:ln>
             <a:extLst>
               <a:ext uri="{91240B29-F687-4f45-9708-019B960494DF}">
-                <a14:hiddenLine xmlns:p14="http://schemas.microsoft.com/office/powerpoint/2010/main" xmlns:a14="http://schemas.microsoft.com/office/drawing/2010/main" xmlns:a16="http://schemas.microsoft.com/office/drawing/2014/main" xmlns="" w="9525">
+                <a14:hiddenLine xmlns="" xmlns:a16="http://schemas.microsoft.com/office/drawing/2014/main" xmlns:a14="http://schemas.microsoft.com/office/drawing/2010/main" xmlns:p14="http://schemas.microsoft.com/office/powerpoint/2010/main" w="9525">
                   <a:solidFill>
                     <a:srgbClr val="000000"/>
                   </a:solidFill>
@@ -15582,7 +15977,7 @@
             </a:ln>
             <a:extLst>
               <a:ext uri="{91240B29-F687-4f45-9708-019B960494DF}">
-                <a14:hiddenLine xmlns:p14="http://schemas.microsoft.com/office/powerpoint/2010/main" xmlns:a14="http://schemas.microsoft.com/office/drawing/2010/main" xmlns:a16="http://schemas.microsoft.com/office/drawing/2014/main" xmlns="" w="9525">
+                <a14:hiddenLine xmlns="" xmlns:a16="http://schemas.microsoft.com/office/drawing/2014/main" xmlns:a14="http://schemas.microsoft.com/office/drawing/2010/main" xmlns:p14="http://schemas.microsoft.com/office/powerpoint/2010/main" w="9525">
                   <a:solidFill>
                     <a:srgbClr val="000000"/>
                   </a:solidFill>
@@ -15687,7 +16082,7 @@
             </a:ln>
             <a:extLst>
               <a:ext uri="{91240B29-F687-4f45-9708-019B960494DF}">
-                <a14:hiddenLine xmlns:p14="http://schemas.microsoft.com/office/powerpoint/2010/main" xmlns:a14="http://schemas.microsoft.com/office/drawing/2010/main" xmlns:a16="http://schemas.microsoft.com/office/drawing/2014/main" xmlns="" w="9525">
+                <a14:hiddenLine xmlns="" xmlns:a16="http://schemas.microsoft.com/office/drawing/2014/main" xmlns:a14="http://schemas.microsoft.com/office/drawing/2010/main" xmlns:p14="http://schemas.microsoft.com/office/powerpoint/2010/main" w="9525">
                   <a:solidFill>
                     <a:srgbClr val="000000"/>
                   </a:solidFill>
@@ -15736,7 +16131,7 @@
             </a:ln>
             <a:extLst>
               <a:ext uri="{91240B29-F687-4f45-9708-019B960494DF}">
-                <a14:hiddenLine xmlns:p14="http://schemas.microsoft.com/office/powerpoint/2010/main" xmlns:a14="http://schemas.microsoft.com/office/drawing/2010/main" xmlns:a16="http://schemas.microsoft.com/office/drawing/2014/main" xmlns="" w="9525">
+                <a14:hiddenLine xmlns="" xmlns:a16="http://schemas.microsoft.com/office/drawing/2014/main" xmlns:a14="http://schemas.microsoft.com/office/drawing/2010/main" xmlns:p14="http://schemas.microsoft.com/office/powerpoint/2010/main" w="9525">
                   <a:solidFill>
                     <a:srgbClr val="000000"/>
                   </a:solidFill>
@@ -15841,7 +16236,7 @@
             </a:ln>
             <a:extLst>
               <a:ext uri="{91240B29-F687-4f45-9708-019B960494DF}">
-                <a14:hiddenLine xmlns:p14="http://schemas.microsoft.com/office/powerpoint/2010/main" xmlns:a14="http://schemas.microsoft.com/office/drawing/2010/main" xmlns:a16="http://schemas.microsoft.com/office/drawing/2014/main" xmlns="" w="9525">
+                <a14:hiddenLine xmlns="" xmlns:a16="http://schemas.microsoft.com/office/drawing/2014/main" xmlns:a14="http://schemas.microsoft.com/office/drawing/2010/main" xmlns:p14="http://schemas.microsoft.com/office/powerpoint/2010/main" w="9525">
                   <a:solidFill>
                     <a:srgbClr val="000000"/>
                   </a:solidFill>
@@ -15918,7 +16313,7 @@
             </a:ln>
             <a:extLst>
               <a:ext uri="{91240B29-F687-4f45-9708-019B960494DF}">
-                <a14:hiddenLine xmlns:p14="http://schemas.microsoft.com/office/powerpoint/2010/main" xmlns:a14="http://schemas.microsoft.com/office/drawing/2010/main" xmlns:a16="http://schemas.microsoft.com/office/drawing/2014/main" xmlns="" w="9525">
+                <a14:hiddenLine xmlns="" xmlns:a16="http://schemas.microsoft.com/office/drawing/2014/main" xmlns:a14="http://schemas.microsoft.com/office/drawing/2010/main" xmlns:p14="http://schemas.microsoft.com/office/powerpoint/2010/main" w="9525">
                   <a:solidFill>
                     <a:srgbClr val="000000"/>
                   </a:solidFill>
@@ -15995,7 +16390,7 @@
             </a:ln>
             <a:extLst>
               <a:ext uri="{91240B29-F687-4f45-9708-019B960494DF}">
-                <a14:hiddenLine xmlns:p14="http://schemas.microsoft.com/office/powerpoint/2010/main" xmlns:a14="http://schemas.microsoft.com/office/drawing/2010/main" xmlns:a16="http://schemas.microsoft.com/office/drawing/2014/main" xmlns="" w="9525">
+                <a14:hiddenLine xmlns="" xmlns:a16="http://schemas.microsoft.com/office/drawing/2014/main" xmlns:a14="http://schemas.microsoft.com/office/drawing/2010/main" xmlns:p14="http://schemas.microsoft.com/office/powerpoint/2010/main" w="9525">
                   <a:solidFill>
                     <a:srgbClr val="000000"/>
                   </a:solidFill>
@@ -16100,7 +16495,7 @@
             </a:ln>
             <a:extLst>
               <a:ext uri="{91240B29-F687-4f45-9708-019B960494DF}">
-                <a14:hiddenLine xmlns:p14="http://schemas.microsoft.com/office/powerpoint/2010/main" xmlns:a14="http://schemas.microsoft.com/office/drawing/2010/main" xmlns:a16="http://schemas.microsoft.com/office/drawing/2014/main" xmlns="" w="9525">
+                <a14:hiddenLine xmlns="" xmlns:a16="http://schemas.microsoft.com/office/drawing/2014/main" xmlns:a14="http://schemas.microsoft.com/office/drawing/2010/main" xmlns:p14="http://schemas.microsoft.com/office/powerpoint/2010/main" w="9525">
                   <a:solidFill>
                     <a:srgbClr val="000000"/>
                   </a:solidFill>
@@ -16177,7 +16572,7 @@
             </a:ln>
             <a:extLst>
               <a:ext uri="{91240B29-F687-4f45-9708-019B960494DF}">
-                <a14:hiddenLine xmlns:p14="http://schemas.microsoft.com/office/powerpoint/2010/main" xmlns:a14="http://schemas.microsoft.com/office/drawing/2010/main" xmlns:a16="http://schemas.microsoft.com/office/drawing/2014/main" xmlns="" w="9525">
+                <a14:hiddenLine xmlns="" xmlns:a16="http://schemas.microsoft.com/office/drawing/2014/main" xmlns:a14="http://schemas.microsoft.com/office/drawing/2010/main" xmlns:p14="http://schemas.microsoft.com/office/powerpoint/2010/main" w="9525">
                   <a:solidFill>
                     <a:srgbClr val="000000"/>
                   </a:solidFill>
@@ -16254,7 +16649,7 @@
             </a:ln>
             <a:extLst>
               <a:ext uri="{91240B29-F687-4f45-9708-019B960494DF}">
-                <a14:hiddenLine xmlns:p14="http://schemas.microsoft.com/office/powerpoint/2010/main" xmlns:a14="http://schemas.microsoft.com/office/drawing/2010/main" xmlns:a16="http://schemas.microsoft.com/office/drawing/2014/main" xmlns="" w="9525">
+                <a14:hiddenLine xmlns="" xmlns:a16="http://schemas.microsoft.com/office/drawing/2014/main" xmlns:a14="http://schemas.microsoft.com/office/drawing/2010/main" xmlns:p14="http://schemas.microsoft.com/office/powerpoint/2010/main" w="9525">
                   <a:solidFill>
                     <a:srgbClr val="000000"/>
                   </a:solidFill>
@@ -16359,7 +16754,7 @@
             </a:ln>
             <a:extLst>
               <a:ext uri="{91240B29-F687-4f45-9708-019B960494DF}">
-                <a14:hiddenLine xmlns:p14="http://schemas.microsoft.com/office/powerpoint/2010/main" xmlns:a14="http://schemas.microsoft.com/office/drawing/2010/main" xmlns:a16="http://schemas.microsoft.com/office/drawing/2014/main" xmlns="" w="9525">
+                <a14:hiddenLine xmlns="" xmlns:a16="http://schemas.microsoft.com/office/drawing/2014/main" xmlns:a14="http://schemas.microsoft.com/office/drawing/2010/main" xmlns:p14="http://schemas.microsoft.com/office/powerpoint/2010/main" w="9525">
                   <a:solidFill>
                     <a:srgbClr val="000000"/>
                   </a:solidFill>
@@ -16464,7 +16859,7 @@
             </a:ln>
             <a:extLst>
               <a:ext uri="{91240B29-F687-4f45-9708-019B960494DF}">
-                <a14:hiddenLine xmlns:p14="http://schemas.microsoft.com/office/powerpoint/2010/main" xmlns:a14="http://schemas.microsoft.com/office/drawing/2010/main" xmlns:a16="http://schemas.microsoft.com/office/drawing/2014/main" xmlns="" w="9525">
+                <a14:hiddenLine xmlns="" xmlns:a16="http://schemas.microsoft.com/office/drawing/2014/main" xmlns:a14="http://schemas.microsoft.com/office/drawing/2010/main" xmlns:p14="http://schemas.microsoft.com/office/powerpoint/2010/main" w="9525">
                   <a:solidFill>
                     <a:srgbClr val="000000"/>
                   </a:solidFill>
@@ -16541,7 +16936,7 @@
             </a:ln>
             <a:extLst>
               <a:ext uri="{91240B29-F687-4f45-9708-019B960494DF}">
-                <a14:hiddenLine xmlns:p14="http://schemas.microsoft.com/office/powerpoint/2010/main" xmlns:a14="http://schemas.microsoft.com/office/drawing/2010/main" xmlns:a16="http://schemas.microsoft.com/office/drawing/2014/main" xmlns="" w="9525">
+                <a14:hiddenLine xmlns="" xmlns:a16="http://schemas.microsoft.com/office/drawing/2014/main" xmlns:a14="http://schemas.microsoft.com/office/drawing/2010/main" xmlns:p14="http://schemas.microsoft.com/office/powerpoint/2010/main" w="9525">
                   <a:solidFill>
                     <a:srgbClr val="000000"/>
                   </a:solidFill>
@@ -16666,7 +17061,7 @@
             </a:ln>
             <a:extLst>
               <a:ext uri="{91240B29-F687-4f45-9708-019B960494DF}">
-                <a14:hiddenLine xmlns:p14="http://schemas.microsoft.com/office/powerpoint/2010/main" xmlns:a14="http://schemas.microsoft.com/office/drawing/2010/main" xmlns:a16="http://schemas.microsoft.com/office/drawing/2014/main" xmlns="" w="9525">
+                <a14:hiddenLine xmlns="" xmlns:a16="http://schemas.microsoft.com/office/drawing/2014/main" xmlns:a14="http://schemas.microsoft.com/office/drawing/2010/main" xmlns:p14="http://schemas.microsoft.com/office/powerpoint/2010/main" w="9525">
                   <a:solidFill>
                     <a:srgbClr val="000000"/>
                   </a:solidFill>
@@ -16743,7 +17138,7 @@
             </a:ln>
             <a:extLst>
               <a:ext uri="{91240B29-F687-4f45-9708-019B960494DF}">
-                <a14:hiddenLine xmlns:p14="http://schemas.microsoft.com/office/powerpoint/2010/main" xmlns:a14="http://schemas.microsoft.com/office/drawing/2010/main" xmlns:a16="http://schemas.microsoft.com/office/drawing/2014/main" xmlns="" w="9525">
+                <a14:hiddenLine xmlns="" xmlns:a16="http://schemas.microsoft.com/office/drawing/2014/main" xmlns:a14="http://schemas.microsoft.com/office/drawing/2010/main" xmlns:p14="http://schemas.microsoft.com/office/powerpoint/2010/main" w="9525">
                   <a:solidFill>
                     <a:srgbClr val="000000"/>
                   </a:solidFill>
@@ -16848,7 +17243,7 @@
             </a:ln>
             <a:extLst>
               <a:ext uri="{91240B29-F687-4f45-9708-019B960494DF}">
-                <a14:hiddenLine xmlns:p14="http://schemas.microsoft.com/office/powerpoint/2010/main" xmlns:a14="http://schemas.microsoft.com/office/drawing/2010/main" xmlns:a16="http://schemas.microsoft.com/office/drawing/2014/main" xmlns="" w="9525">
+                <a14:hiddenLine xmlns="" xmlns:a16="http://schemas.microsoft.com/office/drawing/2014/main" xmlns:a14="http://schemas.microsoft.com/office/drawing/2010/main" xmlns:p14="http://schemas.microsoft.com/office/powerpoint/2010/main" w="9525">
                   <a:solidFill>
                     <a:srgbClr val="000000"/>
                   </a:solidFill>
@@ -16953,7 +17348,7 @@
             </a:ln>
             <a:extLst>
               <a:ext uri="{91240B29-F687-4f45-9708-019B960494DF}">
-                <a14:hiddenLine xmlns:p14="http://schemas.microsoft.com/office/powerpoint/2010/main" xmlns:a14="http://schemas.microsoft.com/office/drawing/2010/main" xmlns:a16="http://schemas.microsoft.com/office/drawing/2014/main" xmlns="" w="9525">
+                <a14:hiddenLine xmlns="" xmlns:a16="http://schemas.microsoft.com/office/drawing/2014/main" xmlns:a14="http://schemas.microsoft.com/office/drawing/2010/main" xmlns:p14="http://schemas.microsoft.com/office/powerpoint/2010/main" w="9525">
                   <a:solidFill>
                     <a:srgbClr val="000000"/>
                   </a:solidFill>
@@ -17030,7 +17425,7 @@
             </a:ln>
             <a:extLst>
               <a:ext uri="{91240B29-F687-4f45-9708-019B960494DF}">
-                <a14:hiddenLine xmlns:p14="http://schemas.microsoft.com/office/powerpoint/2010/main" xmlns:a14="http://schemas.microsoft.com/office/drawing/2010/main" xmlns:a16="http://schemas.microsoft.com/office/drawing/2014/main" xmlns="" w="9525">
+                <a14:hiddenLine xmlns="" xmlns:a16="http://schemas.microsoft.com/office/drawing/2014/main" xmlns:a14="http://schemas.microsoft.com/office/drawing/2010/main" xmlns:p14="http://schemas.microsoft.com/office/powerpoint/2010/main" w="9525">
                   <a:solidFill>
                     <a:srgbClr val="000000"/>
                   </a:solidFill>
@@ -17135,7 +17530,7 @@
             </a:ln>
             <a:extLst>
               <a:ext uri="{91240B29-F687-4f45-9708-019B960494DF}">
-                <a14:hiddenLine xmlns:p14="http://schemas.microsoft.com/office/powerpoint/2010/main" xmlns:a14="http://schemas.microsoft.com/office/drawing/2010/main" xmlns:a16="http://schemas.microsoft.com/office/drawing/2014/main" xmlns="" w="9525">
+                <a14:hiddenLine xmlns="" xmlns:a16="http://schemas.microsoft.com/office/drawing/2014/main" xmlns:a14="http://schemas.microsoft.com/office/drawing/2010/main" xmlns:p14="http://schemas.microsoft.com/office/powerpoint/2010/main" w="9525">
                   <a:solidFill>
                     <a:srgbClr val="000000"/>
                   </a:solidFill>
@@ -17240,7 +17635,7 @@
             </a:ln>
             <a:extLst>
               <a:ext uri="{91240B29-F687-4f45-9708-019B960494DF}">
-                <a14:hiddenLine xmlns:p14="http://schemas.microsoft.com/office/powerpoint/2010/main" xmlns:a14="http://schemas.microsoft.com/office/drawing/2010/main" xmlns:a16="http://schemas.microsoft.com/office/drawing/2014/main" xmlns="" w="9525">
+                <a14:hiddenLine xmlns="" xmlns:a16="http://schemas.microsoft.com/office/drawing/2014/main" xmlns:a14="http://schemas.microsoft.com/office/drawing/2010/main" xmlns:p14="http://schemas.microsoft.com/office/powerpoint/2010/main" w="9525">
                   <a:solidFill>
                     <a:srgbClr val="000000"/>
                   </a:solidFill>
@@ -17311,7 +17706,7 @@
             </a:ln>
             <a:extLst>
               <a:ext uri="{91240B29-F687-4f45-9708-019B960494DF}">
-                <a14:hiddenLine xmlns:p14="http://schemas.microsoft.com/office/powerpoint/2010/main" xmlns:a14="http://schemas.microsoft.com/office/drawing/2010/main" xmlns:a16="http://schemas.microsoft.com/office/drawing/2014/main" xmlns="" w="9525">
+                <a14:hiddenLine xmlns="" xmlns:a16="http://schemas.microsoft.com/office/drawing/2014/main" xmlns:a14="http://schemas.microsoft.com/office/drawing/2010/main" xmlns:p14="http://schemas.microsoft.com/office/powerpoint/2010/main" w="9525">
                   <a:solidFill>
                     <a:srgbClr val="000000"/>
                   </a:solidFill>
@@ -17416,7 +17811,7 @@
             </a:ln>
             <a:extLst>
               <a:ext uri="{91240B29-F687-4f45-9708-019B960494DF}">
-                <a14:hiddenLine xmlns:p14="http://schemas.microsoft.com/office/powerpoint/2010/main" xmlns:a14="http://schemas.microsoft.com/office/drawing/2010/main" xmlns:a16="http://schemas.microsoft.com/office/drawing/2014/main" xmlns="" w="9525">
+                <a14:hiddenLine xmlns="" xmlns:a16="http://schemas.microsoft.com/office/drawing/2014/main" xmlns:a14="http://schemas.microsoft.com/office/drawing/2010/main" xmlns:p14="http://schemas.microsoft.com/office/powerpoint/2010/main" w="9525">
                   <a:solidFill>
                     <a:srgbClr val="000000"/>
                   </a:solidFill>
@@ -17487,7 +17882,7 @@
             </a:ln>
             <a:extLst>
               <a:ext uri="{91240B29-F687-4f45-9708-019B960494DF}">
-                <a14:hiddenLine xmlns:p14="http://schemas.microsoft.com/office/powerpoint/2010/main" xmlns:a14="http://schemas.microsoft.com/office/drawing/2010/main" xmlns:a16="http://schemas.microsoft.com/office/drawing/2014/main" xmlns="" w="9525">
+                <a14:hiddenLine xmlns="" xmlns:a16="http://schemas.microsoft.com/office/drawing/2014/main" xmlns:a14="http://schemas.microsoft.com/office/drawing/2010/main" xmlns:p14="http://schemas.microsoft.com/office/powerpoint/2010/main" w="9525">
                   <a:solidFill>
                     <a:srgbClr val="000000"/>
                   </a:solidFill>
@@ -17592,7 +17987,7 @@
             </a:ln>
             <a:extLst>
               <a:ext uri="{91240B29-F687-4f45-9708-019B960494DF}">
-                <a14:hiddenLine xmlns:p14="http://schemas.microsoft.com/office/powerpoint/2010/main" xmlns:a14="http://schemas.microsoft.com/office/drawing/2010/main" xmlns:a16="http://schemas.microsoft.com/office/drawing/2014/main" xmlns="" w="9525">
+                <a14:hiddenLine xmlns="" xmlns:a16="http://schemas.microsoft.com/office/drawing/2014/main" xmlns:a14="http://schemas.microsoft.com/office/drawing/2010/main" xmlns:p14="http://schemas.microsoft.com/office/powerpoint/2010/main" w="9525">
                   <a:solidFill>
                     <a:srgbClr val="000000"/>
                   </a:solidFill>
@@ -17675,7 +18070,7 @@
             </a:ln>
             <a:extLst>
               <a:ext uri="{91240B29-F687-4f45-9708-019B960494DF}">
-                <a14:hiddenLine xmlns:p14="http://schemas.microsoft.com/office/powerpoint/2010/main" xmlns:a14="http://schemas.microsoft.com/office/drawing/2010/main" xmlns:a16="http://schemas.microsoft.com/office/drawing/2014/main" xmlns="" w="9525">
+                <a14:hiddenLine xmlns="" xmlns:a16="http://schemas.microsoft.com/office/drawing/2014/main" xmlns:a14="http://schemas.microsoft.com/office/drawing/2010/main" xmlns:p14="http://schemas.microsoft.com/office/powerpoint/2010/main" w="9525">
                   <a:solidFill>
                     <a:srgbClr val="000000"/>
                   </a:solidFill>
@@ -17780,7 +18175,7 @@
             </a:ln>
             <a:extLst>
               <a:ext uri="{91240B29-F687-4f45-9708-019B960494DF}">
-                <a14:hiddenLine xmlns:p14="http://schemas.microsoft.com/office/powerpoint/2010/main" xmlns:a14="http://schemas.microsoft.com/office/drawing/2010/main" xmlns:a16="http://schemas.microsoft.com/office/drawing/2014/main" xmlns="" w="9525">
+                <a14:hiddenLine xmlns="" xmlns:a16="http://schemas.microsoft.com/office/drawing/2014/main" xmlns:a14="http://schemas.microsoft.com/office/drawing/2010/main" xmlns:p14="http://schemas.microsoft.com/office/powerpoint/2010/main" w="9525">
                   <a:solidFill>
                     <a:srgbClr val="000000"/>
                   </a:solidFill>
@@ -17863,7 +18258,7 @@
             </a:ln>
             <a:extLst>
               <a:ext uri="{91240B29-F687-4f45-9708-019B960494DF}">
-                <a14:hiddenLine xmlns:p14="http://schemas.microsoft.com/office/powerpoint/2010/main" xmlns:a14="http://schemas.microsoft.com/office/drawing/2010/main" xmlns:a16="http://schemas.microsoft.com/office/drawing/2014/main" xmlns="" w="9525">
+                <a14:hiddenLine xmlns="" xmlns:a16="http://schemas.microsoft.com/office/drawing/2014/main" xmlns:a14="http://schemas.microsoft.com/office/drawing/2010/main" xmlns:p14="http://schemas.microsoft.com/office/powerpoint/2010/main" w="9525">
                   <a:solidFill>
                     <a:srgbClr val="000000"/>
                   </a:solidFill>
@@ -17968,7 +18363,7 @@
             </a:ln>
             <a:extLst>
               <a:ext uri="{91240B29-F687-4f45-9708-019B960494DF}">
-                <a14:hiddenLine xmlns:p14="http://schemas.microsoft.com/office/powerpoint/2010/main" xmlns:a14="http://schemas.microsoft.com/office/drawing/2010/main" xmlns:a16="http://schemas.microsoft.com/office/drawing/2014/main" xmlns="" w="9525">
+                <a14:hiddenLine xmlns="" xmlns:a16="http://schemas.microsoft.com/office/drawing/2014/main" xmlns:a14="http://schemas.microsoft.com/office/drawing/2010/main" xmlns:p14="http://schemas.microsoft.com/office/powerpoint/2010/main" w="9525">
                   <a:solidFill>
                     <a:srgbClr val="000000"/>
                   </a:solidFill>
@@ -18017,7 +18412,7 @@
             </a:ln>
             <a:extLst>
               <a:ext uri="{91240B29-F687-4f45-9708-019B960494DF}">
-                <a14:hiddenLine xmlns:p14="http://schemas.microsoft.com/office/powerpoint/2010/main" xmlns:a14="http://schemas.microsoft.com/office/drawing/2010/main" xmlns:a16="http://schemas.microsoft.com/office/drawing/2014/main" xmlns="" w="9525">
+                <a14:hiddenLine xmlns="" xmlns:a16="http://schemas.microsoft.com/office/drawing/2014/main" xmlns:a14="http://schemas.microsoft.com/office/drawing/2010/main" xmlns:p14="http://schemas.microsoft.com/office/powerpoint/2010/main" w="9525">
                   <a:solidFill>
                     <a:srgbClr val="000000"/>
                   </a:solidFill>
@@ -18122,7 +18517,7 @@
             </a:ln>
             <a:extLst>
               <a:ext uri="{91240B29-F687-4f45-9708-019B960494DF}">
-                <a14:hiddenLine xmlns:p14="http://schemas.microsoft.com/office/powerpoint/2010/main" xmlns:a14="http://schemas.microsoft.com/office/drawing/2010/main" xmlns:a16="http://schemas.microsoft.com/office/drawing/2014/main" xmlns="" w="9525">
+                <a14:hiddenLine xmlns="" xmlns:a16="http://schemas.microsoft.com/office/drawing/2014/main" xmlns:a14="http://schemas.microsoft.com/office/drawing/2010/main" xmlns:p14="http://schemas.microsoft.com/office/powerpoint/2010/main" w="9525">
                   <a:solidFill>
                     <a:srgbClr val="000000"/>
                   </a:solidFill>
@@ -18199,7 +18594,7 @@
             </a:ln>
             <a:extLst>
               <a:ext uri="{91240B29-F687-4f45-9708-019B960494DF}">
-                <a14:hiddenLine xmlns:p14="http://schemas.microsoft.com/office/powerpoint/2010/main" xmlns:a14="http://schemas.microsoft.com/office/drawing/2010/main" xmlns:a16="http://schemas.microsoft.com/office/drawing/2014/main" xmlns="" w="9525">
+                <a14:hiddenLine xmlns="" xmlns:a16="http://schemas.microsoft.com/office/drawing/2014/main" xmlns:a14="http://schemas.microsoft.com/office/drawing/2010/main" xmlns:p14="http://schemas.microsoft.com/office/powerpoint/2010/main" w="9525">
                   <a:solidFill>
                     <a:srgbClr val="000000"/>
                   </a:solidFill>
@@ -18276,7 +18671,7 @@
             </a:ln>
             <a:extLst>
               <a:ext uri="{91240B29-F687-4f45-9708-019B960494DF}">
-                <a14:hiddenLine xmlns:p14="http://schemas.microsoft.com/office/powerpoint/2010/main" xmlns:a14="http://schemas.microsoft.com/office/drawing/2010/main" xmlns:a16="http://schemas.microsoft.com/office/drawing/2014/main" xmlns="" w="9525">
+                <a14:hiddenLine xmlns="" xmlns:a16="http://schemas.microsoft.com/office/drawing/2014/main" xmlns:a14="http://schemas.microsoft.com/office/drawing/2010/main" xmlns:p14="http://schemas.microsoft.com/office/powerpoint/2010/main" w="9525">
                   <a:solidFill>
                     <a:srgbClr val="000000"/>
                   </a:solidFill>
@@ -18381,7 +18776,7 @@
             </a:ln>
             <a:extLst>
               <a:ext uri="{91240B29-F687-4f45-9708-019B960494DF}">
-                <a14:hiddenLine xmlns:p14="http://schemas.microsoft.com/office/powerpoint/2010/main" xmlns:a14="http://schemas.microsoft.com/office/drawing/2010/main" xmlns:a16="http://schemas.microsoft.com/office/drawing/2014/main" xmlns="" w="9525">
+                <a14:hiddenLine xmlns="" xmlns:a16="http://schemas.microsoft.com/office/drawing/2014/main" xmlns:a14="http://schemas.microsoft.com/office/drawing/2010/main" xmlns:p14="http://schemas.microsoft.com/office/powerpoint/2010/main" w="9525">
                   <a:solidFill>
                     <a:srgbClr val="000000"/>
                   </a:solidFill>
@@ -18464,7 +18859,7 @@
             </a:ln>
             <a:extLst>
               <a:ext uri="{91240B29-F687-4f45-9708-019B960494DF}">
-                <a14:hiddenLine xmlns:p14="http://schemas.microsoft.com/office/powerpoint/2010/main" xmlns:a14="http://schemas.microsoft.com/office/drawing/2010/main" xmlns:a16="http://schemas.microsoft.com/office/drawing/2014/main" xmlns="" w="9525">
+                <a14:hiddenLine xmlns="" xmlns:a16="http://schemas.microsoft.com/office/drawing/2014/main" xmlns:a14="http://schemas.microsoft.com/office/drawing/2010/main" xmlns:p14="http://schemas.microsoft.com/office/powerpoint/2010/main" w="9525">
                   <a:solidFill>
                     <a:srgbClr val="000000"/>
                   </a:solidFill>
@@ -18541,7 +18936,7 @@
             </a:ln>
             <a:extLst>
               <a:ext uri="{91240B29-F687-4f45-9708-019B960494DF}">
-                <a14:hiddenLine xmlns:p14="http://schemas.microsoft.com/office/powerpoint/2010/main" xmlns:a14="http://schemas.microsoft.com/office/drawing/2010/main" xmlns:a16="http://schemas.microsoft.com/office/drawing/2014/main" xmlns="" w="9525">
+                <a14:hiddenLine xmlns="" xmlns:a16="http://schemas.microsoft.com/office/drawing/2014/main" xmlns:a14="http://schemas.microsoft.com/office/drawing/2010/main" xmlns:p14="http://schemas.microsoft.com/office/powerpoint/2010/main" w="9525">
                   <a:solidFill>
                     <a:srgbClr val="000000"/>
                   </a:solidFill>
@@ -18646,7 +19041,7 @@
             </a:ln>
             <a:extLst>
               <a:ext uri="{91240B29-F687-4f45-9708-019B960494DF}">
-                <a14:hiddenLine xmlns:p14="http://schemas.microsoft.com/office/powerpoint/2010/main" xmlns:a14="http://schemas.microsoft.com/office/drawing/2010/main" xmlns:a16="http://schemas.microsoft.com/office/drawing/2014/main" xmlns="" w="9525">
+                <a14:hiddenLine xmlns="" xmlns:a16="http://schemas.microsoft.com/office/drawing/2014/main" xmlns:a14="http://schemas.microsoft.com/office/drawing/2010/main" xmlns:p14="http://schemas.microsoft.com/office/powerpoint/2010/main" w="9525">
                   <a:solidFill>
                     <a:srgbClr val="000000"/>
                   </a:solidFill>
@@ -18723,7 +19118,7 @@
             </a:ln>
             <a:extLst>
               <a:ext uri="{91240B29-F687-4f45-9708-019B960494DF}">
-                <a14:hiddenLine xmlns:p14="http://schemas.microsoft.com/office/powerpoint/2010/main" xmlns:a14="http://schemas.microsoft.com/office/drawing/2010/main" xmlns:a16="http://schemas.microsoft.com/office/drawing/2014/main" xmlns="" w="9525">
+                <a14:hiddenLine xmlns="" xmlns:a16="http://schemas.microsoft.com/office/drawing/2014/main" xmlns:a14="http://schemas.microsoft.com/office/drawing/2010/main" xmlns:p14="http://schemas.microsoft.com/office/powerpoint/2010/main" w="9525">
                   <a:solidFill>
                     <a:srgbClr val="000000"/>
                   </a:solidFill>
@@ -18828,7 +19223,7 @@
             </a:ln>
             <a:extLst>
               <a:ext uri="{91240B29-F687-4f45-9708-019B960494DF}">
-                <a14:hiddenLine xmlns:p14="http://schemas.microsoft.com/office/powerpoint/2010/main" xmlns:a14="http://schemas.microsoft.com/office/drawing/2010/main" xmlns:a16="http://schemas.microsoft.com/office/drawing/2014/main" xmlns="" w="9525">
+                <a14:hiddenLine xmlns="" xmlns:a16="http://schemas.microsoft.com/office/drawing/2014/main" xmlns:a14="http://schemas.microsoft.com/office/drawing/2010/main" xmlns:p14="http://schemas.microsoft.com/office/powerpoint/2010/main" w="9525">
                   <a:solidFill>
                     <a:srgbClr val="000000"/>
                   </a:solidFill>
@@ -18905,7 +19300,7 @@
             </a:ln>
             <a:extLst>
               <a:ext uri="{91240B29-F687-4f45-9708-019B960494DF}">
-                <a14:hiddenLine xmlns:p14="http://schemas.microsoft.com/office/powerpoint/2010/main" xmlns:a14="http://schemas.microsoft.com/office/drawing/2010/main" xmlns:a16="http://schemas.microsoft.com/office/drawing/2014/main" xmlns="" w="9525">
+                <a14:hiddenLine xmlns="" xmlns:a16="http://schemas.microsoft.com/office/drawing/2014/main" xmlns:a14="http://schemas.microsoft.com/office/drawing/2010/main" xmlns:p14="http://schemas.microsoft.com/office/powerpoint/2010/main" w="9525">
                   <a:solidFill>
                     <a:srgbClr val="000000"/>
                   </a:solidFill>
@@ -19010,7 +19405,7 @@
             </a:ln>
             <a:extLst>
               <a:ext uri="{91240B29-F687-4f45-9708-019B960494DF}">
-                <a14:hiddenLine xmlns:p14="http://schemas.microsoft.com/office/powerpoint/2010/main" xmlns:a14="http://schemas.microsoft.com/office/drawing/2010/main" xmlns:a16="http://schemas.microsoft.com/office/drawing/2014/main" xmlns="" w="9525">
+                <a14:hiddenLine xmlns="" xmlns:a16="http://schemas.microsoft.com/office/drawing/2014/main" xmlns:a14="http://schemas.microsoft.com/office/drawing/2010/main" xmlns:p14="http://schemas.microsoft.com/office/powerpoint/2010/main" w="9525">
                   <a:solidFill>
                     <a:srgbClr val="000000"/>
                   </a:solidFill>
@@ -19059,7 +19454,7 @@
             </a:ln>
             <a:extLst>
               <a:ext uri="{91240B29-F687-4f45-9708-019B960494DF}">
-                <a14:hiddenLine xmlns:p14="http://schemas.microsoft.com/office/powerpoint/2010/main" xmlns:a14="http://schemas.microsoft.com/office/drawing/2010/main" xmlns:a16="http://schemas.microsoft.com/office/drawing/2014/main" xmlns="" w="9525">
+                <a14:hiddenLine xmlns="" xmlns:a16="http://schemas.microsoft.com/office/drawing/2014/main" xmlns:a14="http://schemas.microsoft.com/office/drawing/2010/main" xmlns:p14="http://schemas.microsoft.com/office/powerpoint/2010/main" w="9525">
                   <a:solidFill>
                     <a:srgbClr val="000000"/>
                   </a:solidFill>
@@ -19139,7 +19534,7 @@
             </a:ln>
             <a:extLst>
               <a:ext uri="{91240B29-F687-4f45-9708-019B960494DF}">
-                <a14:hiddenLine xmlns:p14="http://schemas.microsoft.com/office/powerpoint/2010/main" xmlns:a14="http://schemas.microsoft.com/office/drawing/2010/main" xmlns:a16="http://schemas.microsoft.com/office/drawing/2014/main" xmlns="" w="9525">
+                <a14:hiddenLine xmlns="" xmlns:a16="http://schemas.microsoft.com/office/drawing/2014/main" xmlns:a14="http://schemas.microsoft.com/office/drawing/2010/main" xmlns:p14="http://schemas.microsoft.com/office/powerpoint/2010/main" w="9525">
                   <a:solidFill>
                     <a:srgbClr val="000000"/>
                   </a:solidFill>
@@ -19244,7 +19639,7 @@
             </a:ln>
             <a:extLst>
               <a:ext uri="{91240B29-F687-4f45-9708-019B960494DF}">
-                <a14:hiddenLine xmlns:p14="http://schemas.microsoft.com/office/powerpoint/2010/main" xmlns:a14="http://schemas.microsoft.com/office/drawing/2010/main" xmlns:a16="http://schemas.microsoft.com/office/drawing/2014/main" xmlns="" w="9525">
+                <a14:hiddenLine xmlns="" xmlns:a16="http://schemas.microsoft.com/office/drawing/2014/main" xmlns:a14="http://schemas.microsoft.com/office/drawing/2010/main" xmlns:p14="http://schemas.microsoft.com/office/powerpoint/2010/main" w="9525">
                   <a:solidFill>
                     <a:srgbClr val="000000"/>
                   </a:solidFill>
@@ -19321,7 +19716,7 @@
             </a:ln>
             <a:extLst>
               <a:ext uri="{91240B29-F687-4f45-9708-019B960494DF}">
-                <a14:hiddenLine xmlns:p14="http://schemas.microsoft.com/office/powerpoint/2010/main" xmlns:a14="http://schemas.microsoft.com/office/drawing/2010/main" xmlns:a16="http://schemas.microsoft.com/office/drawing/2014/main" xmlns="" w="9525">
+                <a14:hiddenLine xmlns="" xmlns:a16="http://schemas.microsoft.com/office/drawing/2014/main" xmlns:a14="http://schemas.microsoft.com/office/drawing/2010/main" xmlns:p14="http://schemas.microsoft.com/office/powerpoint/2010/main" w="9525">
                   <a:solidFill>
                     <a:srgbClr val="000000"/>
                   </a:solidFill>
@@ -19426,7 +19821,7 @@
             </a:ln>
             <a:extLst>
               <a:ext uri="{91240B29-F687-4f45-9708-019B960494DF}">
-                <a14:hiddenLine xmlns:p14="http://schemas.microsoft.com/office/powerpoint/2010/main" xmlns:a14="http://schemas.microsoft.com/office/drawing/2010/main" xmlns:a16="http://schemas.microsoft.com/office/drawing/2014/main" xmlns="" w="9525">
+                <a14:hiddenLine xmlns="" xmlns:a16="http://schemas.microsoft.com/office/drawing/2014/main" xmlns:a14="http://schemas.microsoft.com/office/drawing/2010/main" xmlns:p14="http://schemas.microsoft.com/office/powerpoint/2010/main" w="9525">
                   <a:solidFill>
                     <a:srgbClr val="000000"/>
                   </a:solidFill>
@@ -19531,7 +19926,7 @@
             </a:ln>
             <a:extLst>
               <a:ext uri="{91240B29-F687-4f45-9708-019B960494DF}">
-                <a14:hiddenLine xmlns:p14="http://schemas.microsoft.com/office/powerpoint/2010/main" xmlns:a14="http://schemas.microsoft.com/office/drawing/2010/main" xmlns:a16="http://schemas.microsoft.com/office/drawing/2014/main" xmlns="" w="9525">
+                <a14:hiddenLine xmlns="" xmlns:a16="http://schemas.microsoft.com/office/drawing/2014/main" xmlns:a14="http://schemas.microsoft.com/office/drawing/2010/main" xmlns:p14="http://schemas.microsoft.com/office/powerpoint/2010/main" w="9525">
                   <a:solidFill>
                     <a:srgbClr val="000000"/>
                   </a:solidFill>
@@ -19611,7 +20006,7 @@
             </a:ln>
             <a:extLst>
               <a:ext uri="{91240B29-F687-4f45-9708-019B960494DF}">
-                <a14:hiddenLine xmlns:p14="http://schemas.microsoft.com/office/powerpoint/2010/main" xmlns:a14="http://schemas.microsoft.com/office/drawing/2010/main" xmlns:a16="http://schemas.microsoft.com/office/drawing/2014/main" xmlns="" w="9525">
+                <a14:hiddenLine xmlns="" xmlns:a16="http://schemas.microsoft.com/office/drawing/2014/main" xmlns:a14="http://schemas.microsoft.com/office/drawing/2010/main" xmlns:p14="http://schemas.microsoft.com/office/powerpoint/2010/main" w="9525">
                   <a:solidFill>
                     <a:srgbClr val="000000"/>
                   </a:solidFill>
@@ -19688,7 +20083,7 @@
             </a:ln>
             <a:extLst>
               <a:ext uri="{91240B29-F687-4f45-9708-019B960494DF}">
-                <a14:hiddenLine xmlns:p14="http://schemas.microsoft.com/office/powerpoint/2010/main" xmlns:a14="http://schemas.microsoft.com/office/drawing/2010/main" xmlns:a16="http://schemas.microsoft.com/office/drawing/2014/main" xmlns="" w="9525">
+                <a14:hiddenLine xmlns="" xmlns:a16="http://schemas.microsoft.com/office/drawing/2014/main" xmlns:a14="http://schemas.microsoft.com/office/drawing/2010/main" xmlns:p14="http://schemas.microsoft.com/office/powerpoint/2010/main" w="9525">
                   <a:solidFill>
                     <a:srgbClr val="000000"/>
                   </a:solidFill>
@@ -19793,7 +20188,7 @@
             </a:ln>
             <a:extLst>
               <a:ext uri="{91240B29-F687-4f45-9708-019B960494DF}">
-                <a14:hiddenLine xmlns:p14="http://schemas.microsoft.com/office/powerpoint/2010/main" xmlns:a14="http://schemas.microsoft.com/office/drawing/2010/main" xmlns:a16="http://schemas.microsoft.com/office/drawing/2014/main" xmlns="" w="9525">
+                <a14:hiddenLine xmlns="" xmlns:a16="http://schemas.microsoft.com/office/drawing/2014/main" xmlns:a14="http://schemas.microsoft.com/office/drawing/2010/main" xmlns:p14="http://schemas.microsoft.com/office/powerpoint/2010/main" w="9525">
                   <a:solidFill>
                     <a:srgbClr val="000000"/>
                   </a:solidFill>
@@ -19898,7 +20293,7 @@
             </a:ln>
             <a:extLst>
               <a:ext uri="{91240B29-F687-4f45-9708-019B960494DF}">
-                <a14:hiddenLine xmlns:p14="http://schemas.microsoft.com/office/powerpoint/2010/main" xmlns:a14="http://schemas.microsoft.com/office/drawing/2010/main" xmlns:a16="http://schemas.microsoft.com/office/drawing/2014/main" xmlns="" w="9525">
+                <a14:hiddenLine xmlns="" xmlns:a16="http://schemas.microsoft.com/office/drawing/2014/main" xmlns:a14="http://schemas.microsoft.com/office/drawing/2010/main" xmlns:p14="http://schemas.microsoft.com/office/powerpoint/2010/main" w="9525">
                   <a:solidFill>
                     <a:srgbClr val="000000"/>
                   </a:solidFill>
@@ -19975,7 +20370,7 @@
             </a:ln>
             <a:extLst>
               <a:ext uri="{91240B29-F687-4f45-9708-019B960494DF}">
-                <a14:hiddenLine xmlns:p14="http://schemas.microsoft.com/office/powerpoint/2010/main" xmlns:a14="http://schemas.microsoft.com/office/drawing/2010/main" xmlns:a16="http://schemas.microsoft.com/office/drawing/2014/main" xmlns="" w="9525">
+                <a14:hiddenLine xmlns="" xmlns:a16="http://schemas.microsoft.com/office/drawing/2014/main" xmlns:a14="http://schemas.microsoft.com/office/drawing/2010/main" xmlns:p14="http://schemas.microsoft.com/office/powerpoint/2010/main" w="9525">
                   <a:solidFill>
                     <a:srgbClr val="000000"/>
                   </a:solidFill>
@@ -20110,7 +20505,7 @@
             </a:ln>
             <a:extLst>
               <a:ext uri="{91240B29-F687-4f45-9708-019B960494DF}">
-                <a14:hiddenLine xmlns:p14="http://schemas.microsoft.com/office/powerpoint/2010/main" xmlns:a14="http://schemas.microsoft.com/office/drawing/2010/main" xmlns:a16="http://schemas.microsoft.com/office/drawing/2014/main" xmlns="" w="9525">
+                <a14:hiddenLine xmlns="" xmlns:a16="http://schemas.microsoft.com/office/drawing/2014/main" xmlns:a14="http://schemas.microsoft.com/office/drawing/2010/main" xmlns:p14="http://schemas.microsoft.com/office/powerpoint/2010/main" w="9525">
                   <a:solidFill>
                     <a:srgbClr val="000000"/>
                   </a:solidFill>
@@ -20193,7 +20588,7 @@
             </a:ln>
             <a:extLst>
               <a:ext uri="{91240B29-F687-4f45-9708-019B960494DF}">
-                <a14:hiddenLine xmlns:p14="http://schemas.microsoft.com/office/powerpoint/2010/main" xmlns:a14="http://schemas.microsoft.com/office/drawing/2010/main" xmlns:a16="http://schemas.microsoft.com/office/drawing/2014/main" xmlns="" w="9525">
+                <a14:hiddenLine xmlns="" xmlns:a16="http://schemas.microsoft.com/office/drawing/2014/main" xmlns:a14="http://schemas.microsoft.com/office/drawing/2010/main" xmlns:p14="http://schemas.microsoft.com/office/powerpoint/2010/main" w="9525">
                   <a:solidFill>
                     <a:srgbClr val="000000"/>
                   </a:solidFill>
@@ -20298,7 +20693,7 @@
             </a:ln>
             <a:extLst>
               <a:ext uri="{91240B29-F687-4f45-9708-019B960494DF}">
-                <a14:hiddenLine xmlns:p14="http://schemas.microsoft.com/office/powerpoint/2010/main" xmlns:a14="http://schemas.microsoft.com/office/drawing/2010/main" xmlns:a16="http://schemas.microsoft.com/office/drawing/2014/main" xmlns="" w="9525">
+                <a14:hiddenLine xmlns="" xmlns:a16="http://schemas.microsoft.com/office/drawing/2014/main" xmlns:a14="http://schemas.microsoft.com/office/drawing/2010/main" xmlns:p14="http://schemas.microsoft.com/office/powerpoint/2010/main" w="9525">
                   <a:solidFill>
                     <a:srgbClr val="000000"/>
                   </a:solidFill>

</xml_diff>